<commit_message>
Updated graphics and discussion
</commit_message>
<xml_diff>
--- a/Chapter_1/04_Manuscript/GraphicalAbstract.pptx
+++ b/Chapter_1/04_Manuscript/GraphicalAbstract.pptx
@@ -5,10 +5,11 @@
     <p:sldMasterId id="2147483760" r:id="rId1"/>
   </p:sldMasterIdLst>
   <p:notesMasterIdLst>
-    <p:notesMasterId r:id="rId3"/>
+    <p:notesMasterId r:id="rId4"/>
   </p:notesMasterIdLst>
   <p:sldIdLst>
-    <p:sldId id="663" r:id="rId2"/>
+    <p:sldId id="664" r:id="rId2"/>
+    <p:sldId id="663" r:id="rId3"/>
   </p:sldIdLst>
   <p:sldSz cx="12192000" cy="6858000"/>
   <p:notesSz cx="6858000" cy="9144000"/>
@@ -211,7 +212,7 @@
           <a:p>
             <a:fld id="{722DA422-EB42-4655-AEBE-1712E73D511D}" type="datetimeFigureOut">
               <a:rPr lang="de-CH" smtClean="0"/>
-              <a:t>12.05.2021</a:t>
+              <a:t>01.07.2021</a:t>
             </a:fld>
             <a:endParaRPr lang="de-CH"/>
           </a:p>
@@ -553,6 +554,90 @@
     </p:spTree>
     <p:extLst>
       <p:ext uri="{BB962C8B-B14F-4D97-AF65-F5344CB8AC3E}">
+        <p14:creationId xmlns:p14="http://schemas.microsoft.com/office/powerpoint/2010/main" val="1192736836"/>
+      </p:ext>
+    </p:extLst>
+  </p:cSld>
+  <p:clrMapOvr>
+    <a:masterClrMapping/>
+  </p:clrMapOvr>
+</p:notes>
+</file>
+
+<file path=ppt/notesSlides/notesSlide2.xml><?xml version="1.0" encoding="utf-8"?>
+<p:notes xmlns:a="http://schemas.openxmlformats.org/drawingml/2006/main" xmlns:r="http://schemas.openxmlformats.org/officeDocument/2006/relationships" xmlns:p="http://schemas.openxmlformats.org/presentationml/2006/main">
+  <p:cSld>
+    <p:spTree>
+      <p:nvGrpSpPr>
+        <p:cNvPr id="1" name=""/>
+        <p:cNvGrpSpPr/>
+        <p:nvPr/>
+      </p:nvGrpSpPr>
+      <p:grpSpPr>
+        <a:xfrm>
+          <a:off x="0" y="0"/>
+          <a:ext cx="0" cy="0"/>
+          <a:chOff x="0" y="0"/>
+          <a:chExt cx="0" cy="0"/>
+        </a:xfrm>
+      </p:grpSpPr>
+      <p:sp>
+        <p:nvSpPr>
+          <p:cNvPr id="2" name="Folienbildplatzhalter 1"/>
+          <p:cNvSpPr>
+            <a:spLocks noGrp="1" noRot="1" noChangeAspect="1"/>
+          </p:cNvSpPr>
+          <p:nvPr>
+            <p:ph type="sldImg"/>
+          </p:nvPr>
+        </p:nvSpPr>
+        <p:spPr/>
+      </p:sp>
+      <p:sp>
+        <p:nvSpPr>
+          <p:cNvPr id="3" name="Notizenplatzhalter 2"/>
+          <p:cNvSpPr>
+            <a:spLocks noGrp="1"/>
+          </p:cNvSpPr>
+          <p:nvPr>
+            <p:ph type="body" idx="1"/>
+          </p:nvPr>
+        </p:nvSpPr>
+        <p:spPr/>
+        <p:txBody>
+          <a:bodyPr/>
+          <a:lstStyle/>
+          <a:p>
+            <a:endParaRPr lang="de-CH" dirty="0"/>
+          </a:p>
+        </p:txBody>
+      </p:sp>
+      <p:sp>
+        <p:nvSpPr>
+          <p:cNvPr id="4" name="Foliennummernplatzhalter 3"/>
+          <p:cNvSpPr>
+            <a:spLocks noGrp="1"/>
+          </p:cNvSpPr>
+          <p:nvPr>
+            <p:ph type="sldNum" sz="quarter" idx="5"/>
+          </p:nvPr>
+        </p:nvSpPr>
+        <p:spPr/>
+        <p:txBody>
+          <a:bodyPr/>
+          <a:lstStyle/>
+          <a:p>
+            <a:fld id="{801087CD-20FA-433E-8EC6-BE22A5DA7CC1}" type="slidenum">
+              <a:rPr lang="de-CH" smtClean="0"/>
+              <a:t>2</a:t>
+            </a:fld>
+            <a:endParaRPr lang="de-CH"/>
+          </a:p>
+        </p:txBody>
+      </p:sp>
+    </p:spTree>
+    <p:extLst>
+      <p:ext uri="{BB962C8B-B14F-4D97-AF65-F5344CB8AC3E}">
         <p14:creationId xmlns:p14="http://schemas.microsoft.com/office/powerpoint/2010/main" val="1930285335"/>
       </p:ext>
     </p:extLst>
@@ -694,7 +779,7 @@
           <a:p>
             <a:fld id="{DD3FDA8A-CC73-4157-A0F9-CED26375579A}" type="datetimeFigureOut">
               <a:rPr lang="de-CH" smtClean="0"/>
-              <a:t>12.05.2021</a:t>
+              <a:t>01.07.2021</a:t>
             </a:fld>
             <a:endParaRPr lang="de-CH"/>
           </a:p>
@@ -864,7 +949,7 @@
           <a:p>
             <a:fld id="{DD3FDA8A-CC73-4157-A0F9-CED26375579A}" type="datetimeFigureOut">
               <a:rPr lang="de-CH" smtClean="0"/>
-              <a:t>12.05.2021</a:t>
+              <a:t>01.07.2021</a:t>
             </a:fld>
             <a:endParaRPr lang="de-CH"/>
           </a:p>
@@ -1044,7 +1129,7 @@
           <a:p>
             <a:fld id="{DD3FDA8A-CC73-4157-A0F9-CED26375579A}" type="datetimeFigureOut">
               <a:rPr lang="de-CH" smtClean="0"/>
-              <a:t>12.05.2021</a:t>
+              <a:t>01.07.2021</a:t>
             </a:fld>
             <a:endParaRPr lang="de-CH"/>
           </a:p>
@@ -1214,7 +1299,7 @@
           <a:p>
             <a:fld id="{DD3FDA8A-CC73-4157-A0F9-CED26375579A}" type="datetimeFigureOut">
               <a:rPr lang="de-CH" smtClean="0"/>
-              <a:t>12.05.2021</a:t>
+              <a:t>01.07.2021</a:t>
             </a:fld>
             <a:endParaRPr lang="de-CH"/>
           </a:p>
@@ -1460,7 +1545,7 @@
           <a:p>
             <a:fld id="{DD3FDA8A-CC73-4157-A0F9-CED26375579A}" type="datetimeFigureOut">
               <a:rPr lang="de-CH" smtClean="0"/>
-              <a:t>12.05.2021</a:t>
+              <a:t>01.07.2021</a:t>
             </a:fld>
             <a:endParaRPr lang="de-CH"/>
           </a:p>
@@ -1692,7 +1777,7 @@
           <a:p>
             <a:fld id="{DD3FDA8A-CC73-4157-A0F9-CED26375579A}" type="datetimeFigureOut">
               <a:rPr lang="de-CH" smtClean="0"/>
-              <a:t>12.05.2021</a:t>
+              <a:t>01.07.2021</a:t>
             </a:fld>
             <a:endParaRPr lang="de-CH"/>
           </a:p>
@@ -2059,7 +2144,7 @@
           <a:p>
             <a:fld id="{DD3FDA8A-CC73-4157-A0F9-CED26375579A}" type="datetimeFigureOut">
               <a:rPr lang="de-CH" smtClean="0"/>
-              <a:t>12.05.2021</a:t>
+              <a:t>01.07.2021</a:t>
             </a:fld>
             <a:endParaRPr lang="de-CH"/>
           </a:p>
@@ -2177,7 +2262,7 @@
           <a:p>
             <a:fld id="{DD3FDA8A-CC73-4157-A0F9-CED26375579A}" type="datetimeFigureOut">
               <a:rPr lang="de-CH" smtClean="0"/>
-              <a:t>12.05.2021</a:t>
+              <a:t>01.07.2021</a:t>
             </a:fld>
             <a:endParaRPr lang="de-CH"/>
           </a:p>
@@ -2272,7 +2357,7 @@
           <a:p>
             <a:fld id="{DD3FDA8A-CC73-4157-A0F9-CED26375579A}" type="datetimeFigureOut">
               <a:rPr lang="de-CH" smtClean="0"/>
-              <a:t>12.05.2021</a:t>
+              <a:t>01.07.2021</a:t>
             </a:fld>
             <a:endParaRPr lang="de-CH"/>
           </a:p>
@@ -2549,7 +2634,7 @@
           <a:p>
             <a:fld id="{DD3FDA8A-CC73-4157-A0F9-CED26375579A}" type="datetimeFigureOut">
               <a:rPr lang="de-CH" smtClean="0"/>
-              <a:t>12.05.2021</a:t>
+              <a:t>01.07.2021</a:t>
             </a:fld>
             <a:endParaRPr lang="de-CH"/>
           </a:p>
@@ -2806,7 +2891,7 @@
           <a:p>
             <a:fld id="{DD3FDA8A-CC73-4157-A0F9-CED26375579A}" type="datetimeFigureOut">
               <a:rPr lang="de-CH" smtClean="0"/>
-              <a:t>12.05.2021</a:t>
+              <a:t>01.07.2021</a:t>
             </a:fld>
             <a:endParaRPr lang="de-CH"/>
           </a:p>
@@ -3019,7 +3104,7 @@
           <a:p>
             <a:fld id="{DD3FDA8A-CC73-4157-A0F9-CED26375579A}" type="datetimeFigureOut">
               <a:rPr lang="de-CH" smtClean="0"/>
-              <a:t>12.05.2021</a:t>
+              <a:t>01.07.2021</a:t>
             </a:fld>
             <a:endParaRPr lang="de-CH"/>
           </a:p>
@@ -3408,6 +3493,3989 @@
 </file>
 
 <file path=ppt/slides/slide1.xml><?xml version="1.0" encoding="utf-8"?>
+<p:sld xmlns:a="http://schemas.openxmlformats.org/drawingml/2006/main" xmlns:r="http://schemas.openxmlformats.org/officeDocument/2006/relationships" xmlns:p="http://schemas.openxmlformats.org/presentationml/2006/main">
+  <p:cSld>
+    <p:spTree>
+      <p:nvGrpSpPr>
+        <p:cNvPr id="1" name=""/>
+        <p:cNvGrpSpPr/>
+        <p:nvPr/>
+      </p:nvGrpSpPr>
+      <p:grpSpPr>
+        <a:xfrm>
+          <a:off x="0" y="0"/>
+          <a:ext cx="0" cy="0"/>
+          <a:chOff x="0" y="0"/>
+          <a:chExt cx="0" cy="0"/>
+        </a:xfrm>
+      </p:grpSpPr>
+      <p:pic>
+        <p:nvPicPr>
+          <p:cNvPr id="6" name="Grafik 5">
+            <a:extLst>
+              <a:ext uri="{FF2B5EF4-FFF2-40B4-BE49-F238E27FC236}">
+                <a16:creationId xmlns:a16="http://schemas.microsoft.com/office/drawing/2014/main" id="{5A3A86C2-3D81-4668-9B6A-3E7FBF4B11AB}"/>
+              </a:ext>
+            </a:extLst>
+          </p:cNvPr>
+          <p:cNvPicPr>
+            <a:picLocks noChangeAspect="1"/>
+          </p:cNvPicPr>
+          <p:nvPr/>
+        </p:nvPicPr>
+        <p:blipFill rotWithShape="1">
+          <a:blip r:embed="rId3">
+            <a:extLst>
+              <a:ext uri="{28A0092B-C50C-407E-A947-70E740481C1C}">
+                <a14:useLocalDpi xmlns:a14="http://schemas.microsoft.com/office/drawing/2010/main" val="0"/>
+              </a:ext>
+            </a:extLst>
+          </a:blip>
+          <a:srcRect t="15368"/>
+          <a:stretch/>
+        </p:blipFill>
+        <p:spPr>
+          <a:xfrm>
+            <a:off x="4496673" y="4175613"/>
+            <a:ext cx="3657607" cy="2321624"/>
+          </a:xfrm>
+          <a:prstGeom prst="rect">
+            <a:avLst/>
+          </a:prstGeom>
+          <a:effectLst/>
+        </p:spPr>
+      </p:pic>
+      <p:grpSp>
+        <p:nvGrpSpPr>
+          <p:cNvPr id="92" name="Gruppieren 91">
+            <a:extLst>
+              <a:ext uri="{FF2B5EF4-FFF2-40B4-BE49-F238E27FC236}">
+                <a16:creationId xmlns:a16="http://schemas.microsoft.com/office/drawing/2014/main" id="{DA4688E5-1946-48F4-923F-6114FA0F597F}"/>
+              </a:ext>
+            </a:extLst>
+          </p:cNvPr>
+          <p:cNvGrpSpPr/>
+          <p:nvPr/>
+        </p:nvGrpSpPr>
+        <p:grpSpPr>
+          <a:xfrm>
+            <a:off x="44483" y="3708840"/>
+            <a:ext cx="4255831" cy="3165494"/>
+            <a:chOff x="-50520" y="3692506"/>
+            <a:chExt cx="4255831" cy="3165494"/>
+          </a:xfrm>
+        </p:grpSpPr>
+        <p:pic>
+          <p:nvPicPr>
+            <p:cNvPr id="84" name="Grafik 83" descr="Ein Bild, das Karte enthält.&#10;&#10;Automatisch generierte Beschreibung">
+              <a:extLst>
+                <a:ext uri="{FF2B5EF4-FFF2-40B4-BE49-F238E27FC236}">
+                  <a16:creationId xmlns:a16="http://schemas.microsoft.com/office/drawing/2014/main" id="{10B29F5E-7209-4AD9-93FD-2B9602B17E4E}"/>
+                </a:ext>
+              </a:extLst>
+            </p:cNvPr>
+            <p:cNvPicPr>
+              <a:picLocks noChangeAspect="1"/>
+            </p:cNvPicPr>
+            <p:nvPr/>
+          </p:nvPicPr>
+          <p:blipFill>
+            <a:blip r:embed="rId4">
+              <a:extLst>
+                <a:ext uri="{28A0092B-C50C-407E-A947-70E740481C1C}">
+                  <a14:useLocalDpi xmlns:a14="http://schemas.microsoft.com/office/drawing/2010/main" val="0"/>
+                </a:ext>
+              </a:extLst>
+            </a:blip>
+            <a:stretch>
+              <a:fillRect/>
+            </a:stretch>
+          </p:blipFill>
+          <p:spPr>
+            <a:xfrm>
+              <a:off x="-50520" y="3692506"/>
+              <a:ext cx="3165494" cy="3165494"/>
+            </a:xfrm>
+            <a:prstGeom prst="rect">
+              <a:avLst/>
+            </a:prstGeom>
+            <a:effectLst>
+              <a:outerShdw blurRad="50800" dist="38100" dir="13500000" sx="102000" sy="102000" algn="br" rotWithShape="0">
+                <a:prstClr val="black"/>
+              </a:outerShdw>
+            </a:effectLst>
+          </p:spPr>
+        </p:pic>
+        <p:pic>
+          <p:nvPicPr>
+            <p:cNvPr id="85" name="Grafik 84">
+              <a:extLst>
+                <a:ext uri="{FF2B5EF4-FFF2-40B4-BE49-F238E27FC236}">
+                  <a16:creationId xmlns:a16="http://schemas.microsoft.com/office/drawing/2014/main" id="{6FCBCB9B-B1FE-4E85-A0D6-ED2BDB7209C0}"/>
+                </a:ext>
+              </a:extLst>
+            </p:cNvPr>
+            <p:cNvPicPr>
+              <a:picLocks noChangeAspect="1"/>
+            </p:cNvPicPr>
+            <p:nvPr/>
+          </p:nvPicPr>
+          <p:blipFill>
+            <a:blip r:embed="rId5">
+              <a:extLst>
+                <a:ext uri="{28A0092B-C50C-407E-A947-70E740481C1C}">
+                  <a14:useLocalDpi xmlns:a14="http://schemas.microsoft.com/office/drawing/2010/main" val="0"/>
+                </a:ext>
+              </a:extLst>
+            </a:blip>
+            <a:stretch>
+              <a:fillRect/>
+            </a:stretch>
+          </p:blipFill>
+          <p:spPr>
+            <a:xfrm>
+              <a:off x="494648" y="3692506"/>
+              <a:ext cx="3165494" cy="3165494"/>
+            </a:xfrm>
+            <a:prstGeom prst="rect">
+              <a:avLst/>
+            </a:prstGeom>
+            <a:effectLst>
+              <a:outerShdw blurRad="50800" dist="38100" dir="13500000" sx="102000" sy="102000" algn="br" rotWithShape="0">
+                <a:prstClr val="black"/>
+              </a:outerShdw>
+            </a:effectLst>
+          </p:spPr>
+        </p:pic>
+        <p:pic>
+          <p:nvPicPr>
+            <p:cNvPr id="86" name="Grafik 85" descr="Ein Bild, das Stern, Berg enthält.&#10;&#10;Automatisch generierte Beschreibung">
+              <a:extLst>
+                <a:ext uri="{FF2B5EF4-FFF2-40B4-BE49-F238E27FC236}">
+                  <a16:creationId xmlns:a16="http://schemas.microsoft.com/office/drawing/2014/main" id="{C3B8E70A-D0A0-4006-AE1A-701286542F5A}"/>
+                </a:ext>
+              </a:extLst>
+            </p:cNvPr>
+            <p:cNvPicPr>
+              <a:picLocks noChangeAspect="1"/>
+            </p:cNvPicPr>
+            <p:nvPr/>
+          </p:nvPicPr>
+          <p:blipFill>
+            <a:blip r:embed="rId6">
+              <a:extLst>
+                <a:ext uri="{28A0092B-C50C-407E-A947-70E740481C1C}">
+                  <a14:useLocalDpi xmlns:a14="http://schemas.microsoft.com/office/drawing/2010/main" val="0"/>
+                </a:ext>
+              </a:extLst>
+            </a:blip>
+            <a:stretch>
+              <a:fillRect/>
+            </a:stretch>
+          </p:blipFill>
+          <p:spPr>
+            <a:xfrm>
+              <a:off x="1039817" y="3692506"/>
+              <a:ext cx="3165494" cy="3165494"/>
+            </a:xfrm>
+            <a:prstGeom prst="rect">
+              <a:avLst/>
+            </a:prstGeom>
+            <a:effectLst>
+              <a:outerShdw blurRad="50800" dist="38100" dir="13500000" sx="102000" sy="102000" algn="br" rotWithShape="0">
+                <a:prstClr val="black"/>
+              </a:outerShdw>
+            </a:effectLst>
+          </p:spPr>
+        </p:pic>
+      </p:grpSp>
+      <p:sp>
+        <p:nvSpPr>
+          <p:cNvPr id="13" name="Rechteck: abgerundete Ecken 12">
+            <a:extLst>
+              <a:ext uri="{FF2B5EF4-FFF2-40B4-BE49-F238E27FC236}">
+                <a16:creationId xmlns:a16="http://schemas.microsoft.com/office/drawing/2014/main" id="{C91CEFB8-8C4F-4656-80D6-949426281883}"/>
+              </a:ext>
+            </a:extLst>
+          </p:cNvPr>
+          <p:cNvSpPr/>
+          <p:nvPr/>
+        </p:nvSpPr>
+        <p:spPr>
+          <a:xfrm>
+            <a:off x="9214212" y="4750079"/>
+            <a:ext cx="2907156" cy="1548000"/>
+          </a:xfrm>
+          <a:prstGeom prst="roundRect">
+            <a:avLst/>
+          </a:prstGeom>
+          <a:solidFill>
+            <a:schemeClr val="bg1">
+              <a:lumMod val="95000"/>
+            </a:schemeClr>
+          </a:solidFill>
+          <a:ln w="57150">
+            <a:solidFill>
+              <a:schemeClr val="tx1"/>
+            </a:solidFill>
+          </a:ln>
+          <a:effectLst/>
+        </p:spPr>
+        <p:style>
+          <a:lnRef idx="2">
+            <a:schemeClr val="accent1">
+              <a:shade val="50000"/>
+            </a:schemeClr>
+          </a:lnRef>
+          <a:fillRef idx="1">
+            <a:schemeClr val="accent1"/>
+          </a:fillRef>
+          <a:effectRef idx="0">
+            <a:schemeClr val="accent1"/>
+          </a:effectRef>
+          <a:fontRef idx="minor">
+            <a:schemeClr val="lt1"/>
+          </a:fontRef>
+        </p:style>
+        <p:txBody>
+          <a:bodyPr rtlCol="0" anchor="ctr"/>
+          <a:lstStyle/>
+          <a:p>
+            <a:pPr algn="ctr"/>
+            <a:endParaRPr lang="de-CH">
+              <a:latin typeface="Arial" panose="020B0604020202020204" pitchFamily="34" charset="0"/>
+              <a:cs typeface="Arial" panose="020B0604020202020204" pitchFamily="34" charset="0"/>
+            </a:endParaRPr>
+          </a:p>
+        </p:txBody>
+      </p:sp>
+      <p:sp>
+        <p:nvSpPr>
+          <p:cNvPr id="16" name="Textfeld 15">
+            <a:extLst>
+              <a:ext uri="{FF2B5EF4-FFF2-40B4-BE49-F238E27FC236}">
+                <a16:creationId xmlns:a16="http://schemas.microsoft.com/office/drawing/2014/main" id="{FC41CEE4-EF18-4873-B24A-D9EC2DD8EFF9}"/>
+              </a:ext>
+            </a:extLst>
+          </p:cNvPr>
+          <p:cNvSpPr txBox="1"/>
+          <p:nvPr/>
+        </p:nvSpPr>
+        <p:spPr>
+          <a:xfrm>
+            <a:off x="9133170" y="4813509"/>
+            <a:ext cx="3081354" cy="769441"/>
+          </a:xfrm>
+          <a:prstGeom prst="rect">
+            <a:avLst/>
+          </a:prstGeom>
+          <a:noFill/>
+          <a:effectLst/>
+        </p:spPr>
+        <p:txBody>
+          <a:bodyPr wrap="square" rtlCol="0">
+            <a:spAutoFit/>
+          </a:bodyPr>
+          <a:lstStyle/>
+          <a:p>
+            <a:pPr algn="ctr"/>
+            <a:r>
+              <a:rPr lang="de-CH" sz="2000" b="1" dirty="0">
+                <a:latin typeface="Arial" panose="020B0604020202020204" pitchFamily="34" charset="0"/>
+                <a:cs typeface="Arial" panose="020B0604020202020204" pitchFamily="34" charset="0"/>
+              </a:rPr>
+              <a:t>Interpatch Connectivity</a:t>
+            </a:r>
+          </a:p>
+          <a:p>
+            <a:pPr algn="ctr"/>
+            <a:r>
+              <a:rPr lang="de-CH" sz="1200" i="1" dirty="0">
+                <a:latin typeface="Arial" panose="020B0604020202020204" pitchFamily="34" charset="0"/>
+                <a:cs typeface="Arial" panose="020B0604020202020204" pitchFamily="34" charset="0"/>
+              </a:rPr>
+              <a:t>(</a:t>
+            </a:r>
+            <a:r>
+              <a:rPr lang="de-CH" sz="1200" i="1" dirty="0" err="1">
+                <a:latin typeface="Arial" panose="020B0604020202020204" pitchFamily="34" charset="0"/>
+                <a:cs typeface="Arial" panose="020B0604020202020204" pitchFamily="34" charset="0"/>
+              </a:rPr>
+              <a:t>Frequency</a:t>
+            </a:r>
+            <a:r>
+              <a:rPr lang="de-CH" sz="1200" i="1" dirty="0">
+                <a:latin typeface="Arial" panose="020B0604020202020204" pitchFamily="34" charset="0"/>
+                <a:cs typeface="Arial" panose="020B0604020202020204" pitchFamily="34" charset="0"/>
+              </a:rPr>
+              <a:t> &amp; Duration </a:t>
+            </a:r>
+            <a:r>
+              <a:rPr lang="de-CH" sz="1200" i="1" dirty="0" err="1">
+                <a:latin typeface="Arial" panose="020B0604020202020204" pitchFamily="34" charset="0"/>
+                <a:cs typeface="Arial" panose="020B0604020202020204" pitchFamily="34" charset="0"/>
+              </a:rPr>
+              <a:t>of</a:t>
+            </a:r>
+            <a:r>
+              <a:rPr lang="de-CH" sz="1200" i="1" dirty="0">
+                <a:latin typeface="Arial" panose="020B0604020202020204" pitchFamily="34" charset="0"/>
+                <a:cs typeface="Arial" panose="020B0604020202020204" pitchFamily="34" charset="0"/>
+              </a:rPr>
+              <a:t> Connections </a:t>
+            </a:r>
+            <a:r>
+              <a:rPr lang="de-CH" sz="1200" i="1" dirty="0" err="1">
+                <a:latin typeface="Arial" panose="020B0604020202020204" pitchFamily="34" charset="0"/>
+                <a:cs typeface="Arial" panose="020B0604020202020204" pitchFamily="34" charset="0"/>
+              </a:rPr>
+              <a:t>between</a:t>
+            </a:r>
+            <a:r>
+              <a:rPr lang="de-CH" sz="1200" i="1" dirty="0">
+                <a:latin typeface="Arial" panose="020B0604020202020204" pitchFamily="34" charset="0"/>
+                <a:cs typeface="Arial" panose="020B0604020202020204" pitchFamily="34" charset="0"/>
+              </a:rPr>
+              <a:t> Patches)</a:t>
+            </a:r>
+            <a:endParaRPr lang="de-CH" sz="1400" i="1" dirty="0">
+              <a:latin typeface="Arial" panose="020B0604020202020204" pitchFamily="34" charset="0"/>
+              <a:cs typeface="Arial" panose="020B0604020202020204" pitchFamily="34" charset="0"/>
+            </a:endParaRPr>
+          </a:p>
+        </p:txBody>
+      </p:sp>
+      <p:sp>
+        <p:nvSpPr>
+          <p:cNvPr id="12" name="Rechteck: abgerundete Ecken 11">
+            <a:extLst>
+              <a:ext uri="{FF2B5EF4-FFF2-40B4-BE49-F238E27FC236}">
+                <a16:creationId xmlns:a16="http://schemas.microsoft.com/office/drawing/2014/main" id="{DFEC69AD-AFF0-4E35-8D06-0BFC820A7B2C}"/>
+              </a:ext>
+            </a:extLst>
+          </p:cNvPr>
+          <p:cNvSpPr/>
+          <p:nvPr/>
+        </p:nvSpPr>
+        <p:spPr>
+          <a:xfrm>
+            <a:off x="9213874" y="2655214"/>
+            <a:ext cx="2907832" cy="1548000"/>
+          </a:xfrm>
+          <a:prstGeom prst="roundRect">
+            <a:avLst/>
+          </a:prstGeom>
+          <a:solidFill>
+            <a:schemeClr val="bg1">
+              <a:lumMod val="95000"/>
+            </a:schemeClr>
+          </a:solidFill>
+          <a:ln w="57150">
+            <a:solidFill>
+              <a:schemeClr val="tx1"/>
+            </a:solidFill>
+          </a:ln>
+          <a:effectLst/>
+        </p:spPr>
+        <p:style>
+          <a:lnRef idx="2">
+            <a:schemeClr val="accent1">
+              <a:shade val="50000"/>
+            </a:schemeClr>
+          </a:lnRef>
+          <a:fillRef idx="1">
+            <a:schemeClr val="accent1"/>
+          </a:fillRef>
+          <a:effectRef idx="0">
+            <a:schemeClr val="accent1"/>
+          </a:effectRef>
+          <a:fontRef idx="minor">
+            <a:schemeClr val="lt1"/>
+          </a:fontRef>
+        </p:style>
+        <p:txBody>
+          <a:bodyPr rtlCol="0" anchor="ctr"/>
+          <a:lstStyle/>
+          <a:p>
+            <a:pPr algn="ctr"/>
+            <a:endParaRPr lang="de-CH">
+              <a:latin typeface="Arial" panose="020B0604020202020204" pitchFamily="34" charset="0"/>
+              <a:cs typeface="Arial" panose="020B0604020202020204" pitchFamily="34" charset="0"/>
+            </a:endParaRPr>
+          </a:p>
+        </p:txBody>
+      </p:sp>
+      <p:sp>
+        <p:nvSpPr>
+          <p:cNvPr id="15" name="Textfeld 14">
+            <a:extLst>
+              <a:ext uri="{FF2B5EF4-FFF2-40B4-BE49-F238E27FC236}">
+                <a16:creationId xmlns:a16="http://schemas.microsoft.com/office/drawing/2014/main" id="{3F46320C-5660-4D10-99EE-7B1F2F4446C7}"/>
+              </a:ext>
+            </a:extLst>
+          </p:cNvPr>
+          <p:cNvSpPr txBox="1"/>
+          <p:nvPr/>
+        </p:nvSpPr>
+        <p:spPr>
+          <a:xfrm>
+            <a:off x="9286443" y="2684770"/>
+            <a:ext cx="2762694" cy="584775"/>
+          </a:xfrm>
+          <a:prstGeom prst="rect">
+            <a:avLst/>
+          </a:prstGeom>
+          <a:noFill/>
+          <a:effectLst/>
+        </p:spPr>
+        <p:txBody>
+          <a:bodyPr wrap="square" rtlCol="0">
+            <a:spAutoFit/>
+          </a:bodyPr>
+          <a:lstStyle/>
+          <a:p>
+            <a:pPr algn="ctr"/>
+            <a:r>
+              <a:rPr lang="de-CH" sz="2000" b="1" dirty="0" err="1">
+                <a:latin typeface="Arial" panose="020B0604020202020204" pitchFamily="34" charset="0"/>
+                <a:cs typeface="Arial" panose="020B0604020202020204" pitchFamily="34" charset="0"/>
+              </a:rPr>
+              <a:t>Betweenness</a:t>
+            </a:r>
+            <a:endParaRPr lang="de-CH" sz="2000" b="1" dirty="0">
+              <a:latin typeface="Arial" panose="020B0604020202020204" pitchFamily="34" charset="0"/>
+              <a:cs typeface="Arial" panose="020B0604020202020204" pitchFamily="34" charset="0"/>
+            </a:endParaRPr>
+          </a:p>
+          <a:p>
+            <a:pPr algn="ctr"/>
+            <a:r>
+              <a:rPr lang="de-CH" sz="1200" i="1" dirty="0">
+                <a:latin typeface="Arial" panose="020B0604020202020204" pitchFamily="34" charset="0"/>
+                <a:cs typeface="Arial" panose="020B0604020202020204" pitchFamily="34" charset="0"/>
+              </a:rPr>
+              <a:t>(Bottlenecks &amp; </a:t>
+            </a:r>
+            <a:r>
+              <a:rPr lang="de-CH" sz="1200" i="1" dirty="0" err="1">
+                <a:latin typeface="Arial" panose="020B0604020202020204" pitchFamily="34" charset="0"/>
+                <a:cs typeface="Arial" panose="020B0604020202020204" pitchFamily="34" charset="0"/>
+              </a:rPr>
+              <a:t>Dispersal</a:t>
+            </a:r>
+            <a:r>
+              <a:rPr lang="de-CH" sz="1200" i="1" dirty="0">
+                <a:latin typeface="Arial" panose="020B0604020202020204" pitchFamily="34" charset="0"/>
+                <a:cs typeface="Arial" panose="020B0604020202020204" pitchFamily="34" charset="0"/>
+              </a:rPr>
+              <a:t> </a:t>
+            </a:r>
+            <a:r>
+              <a:rPr lang="de-CH" sz="1200" i="1" dirty="0" err="1">
+                <a:latin typeface="Arial" panose="020B0604020202020204" pitchFamily="34" charset="0"/>
+                <a:cs typeface="Arial" panose="020B0604020202020204" pitchFamily="34" charset="0"/>
+              </a:rPr>
+              <a:t>Corridors</a:t>
+            </a:r>
+            <a:r>
+              <a:rPr lang="de-CH" sz="1200" i="1" dirty="0">
+                <a:latin typeface="Arial" panose="020B0604020202020204" pitchFamily="34" charset="0"/>
+                <a:cs typeface="Arial" panose="020B0604020202020204" pitchFamily="34" charset="0"/>
+              </a:rPr>
+              <a:t>)</a:t>
+            </a:r>
+          </a:p>
+        </p:txBody>
+      </p:sp>
+      <p:grpSp>
+        <p:nvGrpSpPr>
+          <p:cNvPr id="29" name="Gruppieren 28">
+            <a:extLst>
+              <a:ext uri="{FF2B5EF4-FFF2-40B4-BE49-F238E27FC236}">
+                <a16:creationId xmlns:a16="http://schemas.microsoft.com/office/drawing/2014/main" id="{0D287DD2-2F62-4EAF-8A6E-652C3BCF9754}"/>
+              </a:ext>
+            </a:extLst>
+          </p:cNvPr>
+          <p:cNvGrpSpPr/>
+          <p:nvPr/>
+        </p:nvGrpSpPr>
+        <p:grpSpPr>
+          <a:xfrm>
+            <a:off x="9270651" y="3289221"/>
+            <a:ext cx="2794280" cy="720000"/>
+            <a:chOff x="8185745" y="3552796"/>
+            <a:chExt cx="2754339" cy="720000"/>
+          </a:xfrm>
+          <a:effectLst/>
+        </p:grpSpPr>
+        <p:pic>
+          <p:nvPicPr>
+            <p:cNvPr id="30" name="Grafik 29">
+              <a:extLst>
+                <a:ext uri="{FF2B5EF4-FFF2-40B4-BE49-F238E27FC236}">
+                  <a16:creationId xmlns:a16="http://schemas.microsoft.com/office/drawing/2014/main" id="{5B196364-6593-4F79-8F6A-BF4E8B1359B0}"/>
+                </a:ext>
+              </a:extLst>
+            </p:cNvPr>
+            <p:cNvPicPr>
+              <a:picLocks noChangeAspect="1"/>
+            </p:cNvPicPr>
+            <p:nvPr/>
+          </p:nvPicPr>
+          <p:blipFill rotWithShape="1">
+            <a:blip r:embed="rId7">
+              <a:clrChange>
+                <a:clrFrom>
+                  <a:srgbClr val="FFFFFF"/>
+                </a:clrFrom>
+                <a:clrTo>
+                  <a:srgbClr val="FFFFFF">
+                    <a:alpha val="0"/>
+                  </a:srgbClr>
+                </a:clrTo>
+              </a:clrChange>
+              <a:extLst>
+                <a:ext uri="{28A0092B-C50C-407E-A947-70E740481C1C}">
+                  <a14:useLocalDpi xmlns:a14="http://schemas.microsoft.com/office/drawing/2010/main" val="0"/>
+                </a:ext>
+              </a:extLst>
+            </a:blip>
+            <a:srcRect l="9667" t="38327" r="5811" b="39578"/>
+            <a:stretch/>
+          </p:blipFill>
+          <p:spPr>
+            <a:xfrm>
+              <a:off x="8185745" y="3552796"/>
+              <a:ext cx="2754339" cy="720000"/>
+            </a:xfrm>
+            <a:prstGeom prst="rect">
+              <a:avLst/>
+            </a:prstGeom>
+          </p:spPr>
+        </p:pic>
+        <p:grpSp>
+          <p:nvGrpSpPr>
+            <p:cNvPr id="32" name="Gruppieren 31">
+              <a:extLst>
+                <a:ext uri="{FF2B5EF4-FFF2-40B4-BE49-F238E27FC236}">
+                  <a16:creationId xmlns:a16="http://schemas.microsoft.com/office/drawing/2014/main" id="{EC9B85FA-4E4F-496E-870C-CE62DB6D8590}"/>
+                </a:ext>
+              </a:extLst>
+            </p:cNvPr>
+            <p:cNvGrpSpPr/>
+            <p:nvPr/>
+          </p:nvGrpSpPr>
+          <p:grpSpPr>
+            <a:xfrm>
+              <a:off x="8279308" y="3675723"/>
+              <a:ext cx="2531532" cy="426463"/>
+              <a:chOff x="7099283" y="3819674"/>
+              <a:chExt cx="2531532" cy="426463"/>
+            </a:xfrm>
+          </p:grpSpPr>
+          <p:sp>
+            <p:nvSpPr>
+              <p:cNvPr id="35" name="Ellipse 34">
+                <a:extLst>
+                  <a:ext uri="{FF2B5EF4-FFF2-40B4-BE49-F238E27FC236}">
+                    <a16:creationId xmlns:a16="http://schemas.microsoft.com/office/drawing/2014/main" id="{A656F889-157C-4207-B76C-01BEB875B268}"/>
+                  </a:ext>
+                </a:extLst>
+              </p:cNvPr>
+              <p:cNvSpPr/>
+              <p:nvPr/>
+            </p:nvSpPr>
+            <p:spPr>
+              <a:xfrm>
+                <a:off x="7099283" y="3822094"/>
+                <a:ext cx="424043" cy="424043"/>
+              </a:xfrm>
+              <a:prstGeom prst="ellipse">
+                <a:avLst/>
+              </a:prstGeom>
+              <a:noFill/>
+              <a:ln w="19050">
+                <a:solidFill>
+                  <a:schemeClr val="tx1"/>
+                </a:solidFill>
+              </a:ln>
+            </p:spPr>
+            <p:style>
+              <a:lnRef idx="2">
+                <a:schemeClr val="accent1">
+                  <a:shade val="50000"/>
+                </a:schemeClr>
+              </a:lnRef>
+              <a:fillRef idx="1">
+                <a:schemeClr val="accent1"/>
+              </a:fillRef>
+              <a:effectRef idx="0">
+                <a:schemeClr val="accent1"/>
+              </a:effectRef>
+              <a:fontRef idx="minor">
+                <a:schemeClr val="lt1"/>
+              </a:fontRef>
+            </p:style>
+            <p:txBody>
+              <a:bodyPr rtlCol="0" anchor="ctr"/>
+              <a:lstStyle/>
+              <a:p>
+                <a:pPr algn="ctr"/>
+                <a:endParaRPr lang="de-CH">
+                  <a:latin typeface="Arial" panose="020B0604020202020204" pitchFamily="34" charset="0"/>
+                  <a:cs typeface="Arial" panose="020B0604020202020204" pitchFamily="34" charset="0"/>
+                </a:endParaRPr>
+              </a:p>
+            </p:txBody>
+          </p:sp>
+          <p:sp>
+            <p:nvSpPr>
+              <p:cNvPr id="36" name="Ellipse 35">
+                <a:extLst>
+                  <a:ext uri="{FF2B5EF4-FFF2-40B4-BE49-F238E27FC236}">
+                    <a16:creationId xmlns:a16="http://schemas.microsoft.com/office/drawing/2014/main" id="{C6F8513B-311A-467B-8B21-4E32B2FAB08A}"/>
+                  </a:ext>
+                </a:extLst>
+              </p:cNvPr>
+              <p:cNvSpPr/>
+              <p:nvPr/>
+            </p:nvSpPr>
+            <p:spPr>
+              <a:xfrm>
+                <a:off x="9206772" y="3819674"/>
+                <a:ext cx="424043" cy="424043"/>
+              </a:xfrm>
+              <a:prstGeom prst="ellipse">
+                <a:avLst/>
+              </a:prstGeom>
+              <a:noFill/>
+              <a:ln w="19050">
+                <a:solidFill>
+                  <a:schemeClr val="tx1"/>
+                </a:solidFill>
+              </a:ln>
+            </p:spPr>
+            <p:style>
+              <a:lnRef idx="2">
+                <a:schemeClr val="accent1">
+                  <a:shade val="50000"/>
+                </a:schemeClr>
+              </a:lnRef>
+              <a:fillRef idx="1">
+                <a:schemeClr val="accent1"/>
+              </a:fillRef>
+              <a:effectRef idx="0">
+                <a:schemeClr val="accent1"/>
+              </a:effectRef>
+              <a:fontRef idx="minor">
+                <a:schemeClr val="lt1"/>
+              </a:fontRef>
+            </p:style>
+            <p:txBody>
+              <a:bodyPr rtlCol="0" anchor="ctr"/>
+              <a:lstStyle/>
+              <a:p>
+                <a:pPr algn="ctr"/>
+                <a:endParaRPr lang="de-CH">
+                  <a:latin typeface="Arial" panose="020B0604020202020204" pitchFamily="34" charset="0"/>
+                  <a:cs typeface="Arial" panose="020B0604020202020204" pitchFamily="34" charset="0"/>
+                </a:endParaRPr>
+              </a:p>
+            </p:txBody>
+          </p:sp>
+        </p:grpSp>
+      </p:grpSp>
+      <p:sp>
+        <p:nvSpPr>
+          <p:cNvPr id="11" name="Rechteck: abgerundete Ecken 10">
+            <a:extLst>
+              <a:ext uri="{FF2B5EF4-FFF2-40B4-BE49-F238E27FC236}">
+                <a16:creationId xmlns:a16="http://schemas.microsoft.com/office/drawing/2014/main" id="{78E20975-2A7C-4FFB-8E68-4F607549ABDE}"/>
+              </a:ext>
+            </a:extLst>
+          </p:cNvPr>
+          <p:cNvSpPr/>
+          <p:nvPr/>
+        </p:nvSpPr>
+        <p:spPr>
+          <a:xfrm>
+            <a:off x="9213874" y="559921"/>
+            <a:ext cx="2907832" cy="1548000"/>
+          </a:xfrm>
+          <a:prstGeom prst="roundRect">
+            <a:avLst/>
+          </a:prstGeom>
+          <a:solidFill>
+            <a:schemeClr val="bg1">
+              <a:lumMod val="95000"/>
+            </a:schemeClr>
+          </a:solidFill>
+          <a:ln w="57150">
+            <a:solidFill>
+              <a:schemeClr val="tx1"/>
+            </a:solidFill>
+          </a:ln>
+          <a:effectLst/>
+        </p:spPr>
+        <p:style>
+          <a:lnRef idx="2">
+            <a:schemeClr val="accent1">
+              <a:shade val="50000"/>
+            </a:schemeClr>
+          </a:lnRef>
+          <a:fillRef idx="1">
+            <a:schemeClr val="accent1"/>
+          </a:fillRef>
+          <a:effectRef idx="0">
+            <a:schemeClr val="accent1"/>
+          </a:effectRef>
+          <a:fontRef idx="minor">
+            <a:schemeClr val="lt1"/>
+          </a:fontRef>
+        </p:style>
+        <p:txBody>
+          <a:bodyPr rtlCol="0" anchor="ctr"/>
+          <a:lstStyle/>
+          <a:p>
+            <a:pPr algn="ctr"/>
+            <a:endParaRPr lang="de-CH">
+              <a:latin typeface="Arial" panose="020B0604020202020204" pitchFamily="34" charset="0"/>
+              <a:cs typeface="Arial" panose="020B0604020202020204" pitchFamily="34" charset="0"/>
+            </a:endParaRPr>
+          </a:p>
+        </p:txBody>
+      </p:sp>
+      <p:sp>
+        <p:nvSpPr>
+          <p:cNvPr id="14" name="Textfeld 13">
+            <a:extLst>
+              <a:ext uri="{FF2B5EF4-FFF2-40B4-BE49-F238E27FC236}">
+                <a16:creationId xmlns:a16="http://schemas.microsoft.com/office/drawing/2014/main" id="{0CEBE216-1DAF-442B-9E53-BD11638C71D1}"/>
+              </a:ext>
+            </a:extLst>
+          </p:cNvPr>
+          <p:cNvSpPr txBox="1"/>
+          <p:nvPr/>
+        </p:nvSpPr>
+        <p:spPr>
+          <a:xfrm>
+            <a:off x="9646440" y="610945"/>
+            <a:ext cx="2042700" cy="584775"/>
+          </a:xfrm>
+          <a:prstGeom prst="rect">
+            <a:avLst/>
+          </a:prstGeom>
+          <a:noFill/>
+          <a:effectLst/>
+        </p:spPr>
+        <p:txBody>
+          <a:bodyPr wrap="square" rtlCol="0">
+            <a:spAutoFit/>
+          </a:bodyPr>
+          <a:lstStyle/>
+          <a:p>
+            <a:pPr algn="ctr"/>
+            <a:r>
+              <a:rPr lang="de-CH" sz="2000" b="1" dirty="0" err="1">
+                <a:latin typeface="Arial" panose="020B0604020202020204" pitchFamily="34" charset="0"/>
+                <a:cs typeface="Arial" panose="020B0604020202020204" pitchFamily="34" charset="0"/>
+              </a:rPr>
+              <a:t>Heatmap</a:t>
+            </a:r>
+            <a:endParaRPr lang="de-CH" sz="2000" b="1" dirty="0">
+              <a:latin typeface="Arial" panose="020B0604020202020204" pitchFamily="34" charset="0"/>
+              <a:cs typeface="Arial" panose="020B0604020202020204" pitchFamily="34" charset="0"/>
+            </a:endParaRPr>
+          </a:p>
+          <a:p>
+            <a:pPr algn="ctr"/>
+            <a:r>
+              <a:rPr lang="de-CH" sz="1200" i="1" dirty="0">
+                <a:latin typeface="Arial" panose="020B0604020202020204" pitchFamily="34" charset="0"/>
+                <a:cs typeface="Arial" panose="020B0604020202020204" pitchFamily="34" charset="0"/>
+              </a:rPr>
+              <a:t>(</a:t>
+            </a:r>
+            <a:r>
+              <a:rPr lang="de-CH" sz="1200" i="1" dirty="0" err="1">
+                <a:latin typeface="Arial" panose="020B0604020202020204" pitchFamily="34" charset="0"/>
+                <a:cs typeface="Arial" panose="020B0604020202020204" pitchFamily="34" charset="0"/>
+              </a:rPr>
+              <a:t>Traversal</a:t>
+            </a:r>
+            <a:r>
+              <a:rPr lang="de-CH" sz="1200" i="1" dirty="0">
+                <a:latin typeface="Arial" panose="020B0604020202020204" pitchFamily="34" charset="0"/>
+                <a:cs typeface="Arial" panose="020B0604020202020204" pitchFamily="34" charset="0"/>
+              </a:rPr>
+              <a:t> </a:t>
+            </a:r>
+            <a:r>
+              <a:rPr lang="de-CH" sz="1200" i="1" dirty="0" err="1">
+                <a:latin typeface="Arial" panose="020B0604020202020204" pitchFamily="34" charset="0"/>
+                <a:cs typeface="Arial" panose="020B0604020202020204" pitchFamily="34" charset="0"/>
+              </a:rPr>
+              <a:t>Frequency</a:t>
+            </a:r>
+            <a:r>
+              <a:rPr lang="de-CH" sz="1200" i="1" dirty="0">
+                <a:latin typeface="Arial" panose="020B0604020202020204" pitchFamily="34" charset="0"/>
+                <a:cs typeface="Arial" panose="020B0604020202020204" pitchFamily="34" charset="0"/>
+              </a:rPr>
+              <a:t>)</a:t>
+            </a:r>
+          </a:p>
+        </p:txBody>
+      </p:sp>
+      <p:grpSp>
+        <p:nvGrpSpPr>
+          <p:cNvPr id="43" name="Gruppieren 42">
+            <a:extLst>
+              <a:ext uri="{FF2B5EF4-FFF2-40B4-BE49-F238E27FC236}">
+                <a16:creationId xmlns:a16="http://schemas.microsoft.com/office/drawing/2014/main" id="{B235B92E-2E9D-46F4-B6A1-B55B33CF5A87}"/>
+              </a:ext>
+            </a:extLst>
+          </p:cNvPr>
+          <p:cNvGrpSpPr/>
+          <p:nvPr/>
+        </p:nvGrpSpPr>
+        <p:grpSpPr>
+          <a:xfrm>
+            <a:off x="9270651" y="1225337"/>
+            <a:ext cx="2794280" cy="720000"/>
+            <a:chOff x="9361407" y="1022116"/>
+            <a:chExt cx="2754339" cy="720000"/>
+          </a:xfrm>
+          <a:effectLst/>
+        </p:grpSpPr>
+        <p:pic>
+          <p:nvPicPr>
+            <p:cNvPr id="17" name="Grafik 16">
+              <a:extLst>
+                <a:ext uri="{FF2B5EF4-FFF2-40B4-BE49-F238E27FC236}">
+                  <a16:creationId xmlns:a16="http://schemas.microsoft.com/office/drawing/2014/main" id="{368AC0D2-7C72-441C-A0F3-7BC5B5290E95}"/>
+                </a:ext>
+              </a:extLst>
+            </p:cNvPr>
+            <p:cNvPicPr>
+              <a:picLocks noChangeAspect="1"/>
+            </p:cNvPicPr>
+            <p:nvPr/>
+          </p:nvPicPr>
+          <p:blipFill rotWithShape="1">
+            <a:blip r:embed="rId8">
+              <a:clrChange>
+                <a:clrFrom>
+                  <a:srgbClr val="FFFFFF"/>
+                </a:clrFrom>
+                <a:clrTo>
+                  <a:srgbClr val="FFFFFF">
+                    <a:alpha val="0"/>
+                  </a:srgbClr>
+                </a:clrTo>
+              </a:clrChange>
+              <a:extLst>
+                <a:ext uri="{28A0092B-C50C-407E-A947-70E740481C1C}">
+                  <a14:useLocalDpi xmlns:a14="http://schemas.microsoft.com/office/drawing/2010/main" val="0"/>
+                </a:ext>
+              </a:extLst>
+            </a:blip>
+            <a:srcRect l="9667" t="38327" r="5811" b="39578"/>
+            <a:stretch/>
+          </p:blipFill>
+          <p:spPr>
+            <a:xfrm>
+              <a:off x="9361407" y="1022116"/>
+              <a:ext cx="2754339" cy="720000"/>
+            </a:xfrm>
+            <a:prstGeom prst="rect">
+              <a:avLst/>
+            </a:prstGeom>
+          </p:spPr>
+        </p:pic>
+        <p:grpSp>
+          <p:nvGrpSpPr>
+            <p:cNvPr id="38" name="Gruppieren 37">
+              <a:extLst>
+                <a:ext uri="{FF2B5EF4-FFF2-40B4-BE49-F238E27FC236}">
+                  <a16:creationId xmlns:a16="http://schemas.microsoft.com/office/drawing/2014/main" id="{3B645E5E-AC82-48EA-819B-74429F7B074F}"/>
+                </a:ext>
+              </a:extLst>
+            </p:cNvPr>
+            <p:cNvGrpSpPr/>
+            <p:nvPr/>
+          </p:nvGrpSpPr>
+          <p:grpSpPr>
+            <a:xfrm>
+              <a:off x="9456741" y="1140966"/>
+              <a:ext cx="2531532" cy="426463"/>
+              <a:chOff x="7099283" y="3819674"/>
+              <a:chExt cx="2531532" cy="426463"/>
+            </a:xfrm>
+          </p:grpSpPr>
+          <p:sp>
+            <p:nvSpPr>
+              <p:cNvPr id="41" name="Ellipse 40">
+                <a:extLst>
+                  <a:ext uri="{FF2B5EF4-FFF2-40B4-BE49-F238E27FC236}">
+                    <a16:creationId xmlns:a16="http://schemas.microsoft.com/office/drawing/2014/main" id="{BED2A378-ACE7-4AE9-97E1-004D74EF89D1}"/>
+                  </a:ext>
+                </a:extLst>
+              </p:cNvPr>
+              <p:cNvSpPr/>
+              <p:nvPr/>
+            </p:nvSpPr>
+            <p:spPr>
+              <a:xfrm>
+                <a:off x="7099283" y="3822094"/>
+                <a:ext cx="424043" cy="424043"/>
+              </a:xfrm>
+              <a:prstGeom prst="ellipse">
+                <a:avLst/>
+              </a:prstGeom>
+              <a:noFill/>
+              <a:ln w="19050">
+                <a:solidFill>
+                  <a:schemeClr val="tx1"/>
+                </a:solidFill>
+              </a:ln>
+            </p:spPr>
+            <p:style>
+              <a:lnRef idx="2">
+                <a:schemeClr val="accent1">
+                  <a:shade val="50000"/>
+                </a:schemeClr>
+              </a:lnRef>
+              <a:fillRef idx="1">
+                <a:schemeClr val="accent1"/>
+              </a:fillRef>
+              <a:effectRef idx="0">
+                <a:schemeClr val="accent1"/>
+              </a:effectRef>
+              <a:fontRef idx="minor">
+                <a:schemeClr val="lt1"/>
+              </a:fontRef>
+            </p:style>
+            <p:txBody>
+              <a:bodyPr rtlCol="0" anchor="ctr"/>
+              <a:lstStyle/>
+              <a:p>
+                <a:pPr algn="ctr"/>
+                <a:endParaRPr lang="de-CH">
+                  <a:latin typeface="Arial" panose="020B0604020202020204" pitchFamily="34" charset="0"/>
+                  <a:cs typeface="Arial" panose="020B0604020202020204" pitchFamily="34" charset="0"/>
+                </a:endParaRPr>
+              </a:p>
+            </p:txBody>
+          </p:sp>
+          <p:sp>
+            <p:nvSpPr>
+              <p:cNvPr id="42" name="Ellipse 41">
+                <a:extLst>
+                  <a:ext uri="{FF2B5EF4-FFF2-40B4-BE49-F238E27FC236}">
+                    <a16:creationId xmlns:a16="http://schemas.microsoft.com/office/drawing/2014/main" id="{7C71377E-C71F-4A3B-B357-0E0AAE8E6EFC}"/>
+                  </a:ext>
+                </a:extLst>
+              </p:cNvPr>
+              <p:cNvSpPr/>
+              <p:nvPr/>
+            </p:nvSpPr>
+            <p:spPr>
+              <a:xfrm>
+                <a:off x="9206772" y="3819674"/>
+                <a:ext cx="424043" cy="424043"/>
+              </a:xfrm>
+              <a:prstGeom prst="ellipse">
+                <a:avLst/>
+              </a:prstGeom>
+              <a:noFill/>
+              <a:ln w="19050">
+                <a:solidFill>
+                  <a:schemeClr val="tx1"/>
+                </a:solidFill>
+              </a:ln>
+            </p:spPr>
+            <p:style>
+              <a:lnRef idx="2">
+                <a:schemeClr val="accent1">
+                  <a:shade val="50000"/>
+                </a:schemeClr>
+              </a:lnRef>
+              <a:fillRef idx="1">
+                <a:schemeClr val="accent1"/>
+              </a:fillRef>
+              <a:effectRef idx="0">
+                <a:schemeClr val="accent1"/>
+              </a:effectRef>
+              <a:fontRef idx="minor">
+                <a:schemeClr val="lt1"/>
+              </a:fontRef>
+            </p:style>
+            <p:txBody>
+              <a:bodyPr rtlCol="0" anchor="ctr"/>
+              <a:lstStyle/>
+              <a:p>
+                <a:pPr algn="ctr"/>
+                <a:endParaRPr lang="de-CH">
+                  <a:latin typeface="Arial" panose="020B0604020202020204" pitchFamily="34" charset="0"/>
+                  <a:cs typeface="Arial" panose="020B0604020202020204" pitchFamily="34" charset="0"/>
+                </a:endParaRPr>
+              </a:p>
+            </p:txBody>
+          </p:sp>
+        </p:grpSp>
+      </p:grpSp>
+      <p:grpSp>
+        <p:nvGrpSpPr>
+          <p:cNvPr id="66" name="Gruppieren 65">
+            <a:extLst>
+              <a:ext uri="{FF2B5EF4-FFF2-40B4-BE49-F238E27FC236}">
+                <a16:creationId xmlns:a16="http://schemas.microsoft.com/office/drawing/2014/main" id="{F733443E-8F34-429D-B824-A1745A62B9E4}"/>
+              </a:ext>
+            </a:extLst>
+          </p:cNvPr>
+          <p:cNvGrpSpPr/>
+          <p:nvPr/>
+        </p:nvGrpSpPr>
+        <p:grpSpPr>
+          <a:xfrm>
+            <a:off x="6131270" y="3013502"/>
+            <a:ext cx="1890690" cy="830996"/>
+            <a:chOff x="6096000" y="3013502"/>
+            <a:chExt cx="1890690" cy="830996"/>
+          </a:xfrm>
+          <a:effectLst/>
+        </p:grpSpPr>
+        <p:sp>
+          <p:nvSpPr>
+            <p:cNvPr id="50" name="Rechteck: abgerundete Ecken 49">
+              <a:extLst>
+                <a:ext uri="{FF2B5EF4-FFF2-40B4-BE49-F238E27FC236}">
+                  <a16:creationId xmlns:a16="http://schemas.microsoft.com/office/drawing/2014/main" id="{2A8EBC37-A12A-463B-AD54-1B6D0011D806}"/>
+                </a:ext>
+              </a:extLst>
+            </p:cNvPr>
+            <p:cNvSpPr/>
+            <p:nvPr/>
+          </p:nvSpPr>
+          <p:spPr>
+            <a:xfrm>
+              <a:off x="6096000" y="3013502"/>
+              <a:ext cx="1890690" cy="830996"/>
+            </a:xfrm>
+            <a:prstGeom prst="roundRect">
+              <a:avLst/>
+            </a:prstGeom>
+            <a:solidFill>
+              <a:schemeClr val="bg1">
+                <a:lumMod val="95000"/>
+              </a:schemeClr>
+            </a:solidFill>
+            <a:ln w="57150">
+              <a:solidFill>
+                <a:schemeClr val="tx1"/>
+              </a:solidFill>
+            </a:ln>
+          </p:spPr>
+          <p:style>
+            <a:lnRef idx="2">
+              <a:schemeClr val="accent1">
+                <a:shade val="50000"/>
+              </a:schemeClr>
+            </a:lnRef>
+            <a:fillRef idx="1">
+              <a:schemeClr val="accent1"/>
+            </a:fillRef>
+            <a:effectRef idx="0">
+              <a:schemeClr val="accent1"/>
+            </a:effectRef>
+            <a:fontRef idx="minor">
+              <a:schemeClr val="lt1"/>
+            </a:fontRef>
+          </p:style>
+          <p:txBody>
+            <a:bodyPr rtlCol="0" anchor="ctr"/>
+            <a:lstStyle/>
+            <a:p>
+              <a:pPr algn="ctr"/>
+              <a:endParaRPr lang="de-CH">
+                <a:latin typeface="Arial" panose="020B0604020202020204" pitchFamily="34" charset="0"/>
+                <a:cs typeface="Arial" panose="020B0604020202020204" pitchFamily="34" charset="0"/>
+              </a:endParaRPr>
+            </a:p>
+          </p:txBody>
+        </p:sp>
+        <p:sp>
+          <p:nvSpPr>
+            <p:cNvPr id="49" name="Textfeld 48">
+              <a:extLst>
+                <a:ext uri="{FF2B5EF4-FFF2-40B4-BE49-F238E27FC236}">
+                  <a16:creationId xmlns:a16="http://schemas.microsoft.com/office/drawing/2014/main" id="{FC55F3A3-9478-4A56-8F45-49F9CEDF341A}"/>
+                </a:ext>
+              </a:extLst>
+            </p:cNvPr>
+            <p:cNvSpPr txBox="1"/>
+            <p:nvPr/>
+          </p:nvSpPr>
+          <p:spPr>
+            <a:xfrm>
+              <a:off x="6294828" y="3078867"/>
+              <a:ext cx="1503404" cy="707886"/>
+            </a:xfrm>
+            <a:prstGeom prst="rect">
+              <a:avLst/>
+            </a:prstGeom>
+            <a:noFill/>
+          </p:spPr>
+          <p:txBody>
+            <a:bodyPr wrap="square" rtlCol="0">
+              <a:spAutoFit/>
+            </a:bodyPr>
+            <a:lstStyle/>
+            <a:p>
+              <a:pPr algn="ctr"/>
+              <a:r>
+                <a:rPr lang="de-CH" sz="2000" b="1" dirty="0" err="1">
+                  <a:latin typeface="Arial" panose="020B0604020202020204" pitchFamily="34" charset="0"/>
+                  <a:cs typeface="Arial" panose="020B0604020202020204" pitchFamily="34" charset="0"/>
+                </a:rPr>
+                <a:t>Dispersal</a:t>
+              </a:r>
+              <a:r>
+                <a:rPr lang="de-CH" sz="2000" b="1" dirty="0">
+                  <a:latin typeface="Arial" panose="020B0604020202020204" pitchFamily="34" charset="0"/>
+                  <a:cs typeface="Arial" panose="020B0604020202020204" pitchFamily="34" charset="0"/>
+                </a:rPr>
+                <a:t> Simulation</a:t>
+              </a:r>
+            </a:p>
+          </p:txBody>
+        </p:sp>
+      </p:grpSp>
+      <p:cxnSp>
+        <p:nvCxnSpPr>
+          <p:cNvPr id="52" name="Verbinder: gekrümmt 51">
+            <a:extLst>
+              <a:ext uri="{FF2B5EF4-FFF2-40B4-BE49-F238E27FC236}">
+                <a16:creationId xmlns:a16="http://schemas.microsoft.com/office/drawing/2014/main" id="{5902C8AC-CB59-42CA-850C-108E032184B0}"/>
+              </a:ext>
+            </a:extLst>
+          </p:cNvPr>
+          <p:cNvCxnSpPr>
+            <a:cxnSpLocks/>
+            <a:stCxn id="50" idx="3"/>
+            <a:endCxn id="11" idx="1"/>
+          </p:cNvCxnSpPr>
+          <p:nvPr/>
+        </p:nvCxnSpPr>
+        <p:spPr>
+          <a:xfrm flipV="1">
+            <a:off x="8021960" y="1333921"/>
+            <a:ext cx="1191914" cy="2095079"/>
+          </a:xfrm>
+          <a:prstGeom prst="curvedConnector3">
+            <a:avLst/>
+          </a:prstGeom>
+          <a:ln w="28575">
+            <a:solidFill>
+              <a:schemeClr val="tx1"/>
+            </a:solidFill>
+            <a:tailEnd type="triangle"/>
+          </a:ln>
+          <a:effectLst/>
+        </p:spPr>
+        <p:style>
+          <a:lnRef idx="1">
+            <a:schemeClr val="accent1"/>
+          </a:lnRef>
+          <a:fillRef idx="0">
+            <a:schemeClr val="accent1"/>
+          </a:fillRef>
+          <a:effectRef idx="0">
+            <a:schemeClr val="accent1"/>
+          </a:effectRef>
+          <a:fontRef idx="minor">
+            <a:schemeClr val="tx1"/>
+          </a:fontRef>
+        </p:style>
+      </p:cxnSp>
+      <p:cxnSp>
+        <p:nvCxnSpPr>
+          <p:cNvPr id="57" name="Verbinder: gekrümmt 56">
+            <a:extLst>
+              <a:ext uri="{FF2B5EF4-FFF2-40B4-BE49-F238E27FC236}">
+                <a16:creationId xmlns:a16="http://schemas.microsoft.com/office/drawing/2014/main" id="{D3964046-02AE-45A5-B3E5-662F0E1BFA76}"/>
+              </a:ext>
+            </a:extLst>
+          </p:cNvPr>
+          <p:cNvCxnSpPr>
+            <a:cxnSpLocks/>
+            <a:stCxn id="50" idx="3"/>
+            <a:endCxn id="12" idx="1"/>
+          </p:cNvCxnSpPr>
+          <p:nvPr/>
+        </p:nvCxnSpPr>
+        <p:spPr>
+          <a:xfrm>
+            <a:off x="8021960" y="3429000"/>
+            <a:ext cx="1191914" cy="214"/>
+          </a:xfrm>
+          <a:prstGeom prst="curvedConnector3">
+            <a:avLst>
+              <a:gd name="adj1" fmla="val 50000"/>
+            </a:avLst>
+          </a:prstGeom>
+          <a:ln w="28575">
+            <a:solidFill>
+              <a:schemeClr val="tx1"/>
+            </a:solidFill>
+            <a:tailEnd type="triangle"/>
+          </a:ln>
+          <a:effectLst/>
+        </p:spPr>
+        <p:style>
+          <a:lnRef idx="1">
+            <a:schemeClr val="accent1"/>
+          </a:lnRef>
+          <a:fillRef idx="0">
+            <a:schemeClr val="accent1"/>
+          </a:fillRef>
+          <a:effectRef idx="0">
+            <a:schemeClr val="accent1"/>
+          </a:effectRef>
+          <a:fontRef idx="minor">
+            <a:schemeClr val="tx1"/>
+          </a:fontRef>
+        </p:style>
+      </p:cxnSp>
+      <p:cxnSp>
+        <p:nvCxnSpPr>
+          <p:cNvPr id="63" name="Verbinder: gekrümmt 62">
+            <a:extLst>
+              <a:ext uri="{FF2B5EF4-FFF2-40B4-BE49-F238E27FC236}">
+                <a16:creationId xmlns:a16="http://schemas.microsoft.com/office/drawing/2014/main" id="{51E705F5-0C76-4D15-B0B3-0DB72A522694}"/>
+              </a:ext>
+            </a:extLst>
+          </p:cNvPr>
+          <p:cNvCxnSpPr>
+            <a:cxnSpLocks/>
+            <a:stCxn id="50" idx="3"/>
+            <a:endCxn id="13" idx="1"/>
+          </p:cNvCxnSpPr>
+          <p:nvPr/>
+        </p:nvCxnSpPr>
+        <p:spPr>
+          <a:xfrm>
+            <a:off x="8021960" y="3429000"/>
+            <a:ext cx="1192252" cy="2095079"/>
+          </a:xfrm>
+          <a:prstGeom prst="curvedConnector3">
+            <a:avLst>
+              <a:gd name="adj1" fmla="val 50000"/>
+            </a:avLst>
+          </a:prstGeom>
+          <a:ln w="28575">
+            <a:solidFill>
+              <a:schemeClr val="tx1"/>
+            </a:solidFill>
+            <a:tailEnd type="triangle"/>
+          </a:ln>
+          <a:effectLst/>
+        </p:spPr>
+        <p:style>
+          <a:lnRef idx="1">
+            <a:schemeClr val="accent1"/>
+          </a:lnRef>
+          <a:fillRef idx="0">
+            <a:schemeClr val="accent1"/>
+          </a:fillRef>
+          <a:effectRef idx="0">
+            <a:schemeClr val="accent1"/>
+          </a:effectRef>
+          <a:fontRef idx="minor">
+            <a:schemeClr val="tx1"/>
+          </a:fontRef>
+        </p:style>
+      </p:cxnSp>
+      <p:grpSp>
+        <p:nvGrpSpPr>
+          <p:cNvPr id="67" name="Gruppieren 66">
+            <a:extLst>
+              <a:ext uri="{FF2B5EF4-FFF2-40B4-BE49-F238E27FC236}">
+                <a16:creationId xmlns:a16="http://schemas.microsoft.com/office/drawing/2014/main" id="{5BFEDF25-5E69-405D-8276-1C5191B39A33}"/>
+              </a:ext>
+            </a:extLst>
+          </p:cNvPr>
+          <p:cNvGrpSpPr/>
+          <p:nvPr/>
+        </p:nvGrpSpPr>
+        <p:grpSpPr>
+          <a:xfrm>
+            <a:off x="3229862" y="3017312"/>
+            <a:ext cx="2241092" cy="830996"/>
+            <a:chOff x="6096000" y="3013502"/>
+            <a:chExt cx="1890690" cy="830996"/>
+          </a:xfrm>
+          <a:effectLst/>
+        </p:grpSpPr>
+        <p:sp>
+          <p:nvSpPr>
+            <p:cNvPr id="68" name="Rechteck: abgerundete Ecken 67">
+              <a:extLst>
+                <a:ext uri="{FF2B5EF4-FFF2-40B4-BE49-F238E27FC236}">
+                  <a16:creationId xmlns:a16="http://schemas.microsoft.com/office/drawing/2014/main" id="{FA6A1B46-3A9F-4E82-9EE8-97A9DE5B1761}"/>
+                </a:ext>
+              </a:extLst>
+            </p:cNvPr>
+            <p:cNvSpPr/>
+            <p:nvPr/>
+          </p:nvSpPr>
+          <p:spPr>
+            <a:xfrm>
+              <a:off x="6096000" y="3013502"/>
+              <a:ext cx="1890690" cy="830996"/>
+            </a:xfrm>
+            <a:prstGeom prst="roundRect">
+              <a:avLst/>
+            </a:prstGeom>
+            <a:solidFill>
+              <a:schemeClr val="bg1">
+                <a:lumMod val="95000"/>
+              </a:schemeClr>
+            </a:solidFill>
+            <a:ln w="57150">
+              <a:solidFill>
+                <a:schemeClr val="tx1"/>
+              </a:solidFill>
+            </a:ln>
+          </p:spPr>
+          <p:style>
+            <a:lnRef idx="2">
+              <a:schemeClr val="accent1">
+                <a:shade val="50000"/>
+              </a:schemeClr>
+            </a:lnRef>
+            <a:fillRef idx="1">
+              <a:schemeClr val="accent1"/>
+            </a:fillRef>
+            <a:effectRef idx="0">
+              <a:schemeClr val="accent1"/>
+            </a:effectRef>
+            <a:fontRef idx="minor">
+              <a:schemeClr val="lt1"/>
+            </a:fontRef>
+          </p:style>
+          <p:txBody>
+            <a:bodyPr rtlCol="0" anchor="ctr"/>
+            <a:lstStyle/>
+            <a:p>
+              <a:pPr algn="ctr"/>
+              <a:endParaRPr lang="de-CH">
+                <a:latin typeface="Arial" panose="020B0604020202020204" pitchFamily="34" charset="0"/>
+                <a:cs typeface="Arial" panose="020B0604020202020204" pitchFamily="34" charset="0"/>
+              </a:endParaRPr>
+            </a:p>
+          </p:txBody>
+        </p:sp>
+        <p:sp>
+          <p:nvSpPr>
+            <p:cNvPr id="69" name="Textfeld 68">
+              <a:extLst>
+                <a:ext uri="{FF2B5EF4-FFF2-40B4-BE49-F238E27FC236}">
+                  <a16:creationId xmlns:a16="http://schemas.microsoft.com/office/drawing/2014/main" id="{268DA110-808B-411E-8A91-FE8663207E99}"/>
+                </a:ext>
+              </a:extLst>
+            </p:cNvPr>
+            <p:cNvSpPr txBox="1"/>
+            <p:nvPr/>
+          </p:nvSpPr>
+          <p:spPr>
+            <a:xfrm>
+              <a:off x="6133660" y="3065788"/>
+              <a:ext cx="1811902" cy="707886"/>
+            </a:xfrm>
+            <a:prstGeom prst="rect">
+              <a:avLst/>
+            </a:prstGeom>
+            <a:noFill/>
+          </p:spPr>
+          <p:txBody>
+            <a:bodyPr wrap="square" rtlCol="0">
+              <a:spAutoFit/>
+            </a:bodyPr>
+            <a:lstStyle/>
+            <a:p>
+              <a:pPr algn="ctr"/>
+              <a:r>
+                <a:rPr lang="de-CH" sz="2000" b="1" dirty="0">
+                  <a:latin typeface="Arial" panose="020B0604020202020204" pitchFamily="34" charset="0"/>
+                  <a:cs typeface="Arial" panose="020B0604020202020204" pitchFamily="34" charset="0"/>
+                </a:rPr>
+                <a:t>Integrated </a:t>
+              </a:r>
+              <a:r>
+                <a:rPr lang="de-CH" sz="2000" b="1" dirty="0" err="1">
+                  <a:latin typeface="Arial" panose="020B0604020202020204" pitchFamily="34" charset="0"/>
+                  <a:cs typeface="Arial" panose="020B0604020202020204" pitchFamily="34" charset="0"/>
+                </a:rPr>
+                <a:t>Step</a:t>
+              </a:r>
+              <a:r>
+                <a:rPr lang="de-CH" sz="2000" b="1" dirty="0">
+                  <a:latin typeface="Arial" panose="020B0604020202020204" pitchFamily="34" charset="0"/>
+                  <a:cs typeface="Arial" panose="020B0604020202020204" pitchFamily="34" charset="0"/>
+                </a:rPr>
+                <a:t> </a:t>
+              </a:r>
+              <a:r>
+                <a:rPr lang="de-CH" sz="2000" b="1" dirty="0" err="1">
+                  <a:latin typeface="Arial" panose="020B0604020202020204" pitchFamily="34" charset="0"/>
+                  <a:cs typeface="Arial" panose="020B0604020202020204" pitchFamily="34" charset="0"/>
+                </a:rPr>
+                <a:t>Selection</a:t>
+              </a:r>
+              <a:r>
+                <a:rPr lang="de-CH" sz="2000" b="1" dirty="0">
+                  <a:latin typeface="Arial" panose="020B0604020202020204" pitchFamily="34" charset="0"/>
+                  <a:cs typeface="Arial" panose="020B0604020202020204" pitchFamily="34" charset="0"/>
+                </a:rPr>
+                <a:t> Model</a:t>
+              </a:r>
+            </a:p>
+          </p:txBody>
+        </p:sp>
+      </p:grpSp>
+      <p:grpSp>
+        <p:nvGrpSpPr>
+          <p:cNvPr id="70" name="Gruppieren 69">
+            <a:extLst>
+              <a:ext uri="{FF2B5EF4-FFF2-40B4-BE49-F238E27FC236}">
+                <a16:creationId xmlns:a16="http://schemas.microsoft.com/office/drawing/2014/main" id="{2517A065-FB9D-4D14-8E2D-AE3726C244EB}"/>
+              </a:ext>
+            </a:extLst>
+          </p:cNvPr>
+          <p:cNvGrpSpPr/>
+          <p:nvPr/>
+        </p:nvGrpSpPr>
+        <p:grpSpPr>
+          <a:xfrm>
+            <a:off x="20551" y="3021122"/>
+            <a:ext cx="2594933" cy="830996"/>
+            <a:chOff x="6061303" y="3013502"/>
+            <a:chExt cx="1960086" cy="830996"/>
+          </a:xfrm>
+          <a:effectLst/>
+        </p:grpSpPr>
+        <p:sp>
+          <p:nvSpPr>
+            <p:cNvPr id="71" name="Rechteck: abgerundete Ecken 70">
+              <a:extLst>
+                <a:ext uri="{FF2B5EF4-FFF2-40B4-BE49-F238E27FC236}">
+                  <a16:creationId xmlns:a16="http://schemas.microsoft.com/office/drawing/2014/main" id="{950820C7-3596-47F6-91A4-94427F58E5D4}"/>
+                </a:ext>
+              </a:extLst>
+            </p:cNvPr>
+            <p:cNvSpPr/>
+            <p:nvPr/>
+          </p:nvSpPr>
+          <p:spPr>
+            <a:xfrm>
+              <a:off x="6096000" y="3013502"/>
+              <a:ext cx="1890690" cy="830996"/>
+            </a:xfrm>
+            <a:prstGeom prst="roundRect">
+              <a:avLst/>
+            </a:prstGeom>
+            <a:solidFill>
+              <a:schemeClr val="bg1">
+                <a:lumMod val="95000"/>
+              </a:schemeClr>
+            </a:solidFill>
+            <a:ln w="57150">
+              <a:solidFill>
+                <a:schemeClr val="tx1"/>
+              </a:solidFill>
+            </a:ln>
+          </p:spPr>
+          <p:style>
+            <a:lnRef idx="2">
+              <a:schemeClr val="accent1">
+                <a:shade val="50000"/>
+              </a:schemeClr>
+            </a:lnRef>
+            <a:fillRef idx="1">
+              <a:schemeClr val="accent1"/>
+            </a:fillRef>
+            <a:effectRef idx="0">
+              <a:schemeClr val="accent1"/>
+            </a:effectRef>
+            <a:fontRef idx="minor">
+              <a:schemeClr val="lt1"/>
+            </a:fontRef>
+          </p:style>
+          <p:txBody>
+            <a:bodyPr rtlCol="0" anchor="ctr"/>
+            <a:lstStyle/>
+            <a:p>
+              <a:pPr algn="ctr"/>
+              <a:endParaRPr lang="de-CH">
+                <a:latin typeface="Arial" panose="020B0604020202020204" pitchFamily="34" charset="0"/>
+                <a:cs typeface="Arial" panose="020B0604020202020204" pitchFamily="34" charset="0"/>
+              </a:endParaRPr>
+            </a:p>
+          </p:txBody>
+        </p:sp>
+        <p:sp>
+          <p:nvSpPr>
+            <p:cNvPr id="72" name="Textfeld 71">
+              <a:extLst>
+                <a:ext uri="{FF2B5EF4-FFF2-40B4-BE49-F238E27FC236}">
+                  <a16:creationId xmlns:a16="http://schemas.microsoft.com/office/drawing/2014/main" id="{3B4CE0BA-1788-4EED-A4A7-896A3C686149}"/>
+                </a:ext>
+              </a:extLst>
+            </p:cNvPr>
+            <p:cNvSpPr txBox="1"/>
+            <p:nvPr/>
+          </p:nvSpPr>
+          <p:spPr>
+            <a:xfrm>
+              <a:off x="6061303" y="3074955"/>
+              <a:ext cx="1960086" cy="707886"/>
+            </a:xfrm>
+            <a:prstGeom prst="rect">
+              <a:avLst/>
+            </a:prstGeom>
+            <a:noFill/>
+          </p:spPr>
+          <p:txBody>
+            <a:bodyPr wrap="square" rtlCol="0">
+              <a:spAutoFit/>
+            </a:bodyPr>
+            <a:lstStyle/>
+            <a:p>
+              <a:pPr algn="ctr"/>
+              <a:r>
+                <a:rPr lang="de-CH" sz="2000" b="1" dirty="0">
+                  <a:latin typeface="Arial" panose="020B0604020202020204" pitchFamily="34" charset="0"/>
+                  <a:cs typeface="Arial" panose="020B0604020202020204" pitchFamily="34" charset="0"/>
+                </a:rPr>
+                <a:t>GPS Data &amp;</a:t>
+              </a:r>
+            </a:p>
+            <a:p>
+              <a:pPr algn="ctr"/>
+              <a:r>
+                <a:rPr lang="de-CH" sz="2000" b="1" dirty="0">
+                  <a:latin typeface="Arial" panose="020B0604020202020204" pitchFamily="34" charset="0"/>
+                  <a:cs typeface="Arial" panose="020B0604020202020204" pitchFamily="34" charset="0"/>
+                </a:rPr>
+                <a:t>Habitat </a:t>
+              </a:r>
+              <a:r>
+                <a:rPr lang="de-CH" sz="2000" b="1" dirty="0" err="1">
+                  <a:latin typeface="Arial" panose="020B0604020202020204" pitchFamily="34" charset="0"/>
+                  <a:cs typeface="Arial" panose="020B0604020202020204" pitchFamily="34" charset="0"/>
+                </a:rPr>
+                <a:t>Covariates</a:t>
+              </a:r>
+              <a:endParaRPr lang="de-CH" sz="2000" b="1" dirty="0">
+                <a:latin typeface="Arial" panose="020B0604020202020204" pitchFamily="34" charset="0"/>
+                <a:cs typeface="Arial" panose="020B0604020202020204" pitchFamily="34" charset="0"/>
+              </a:endParaRPr>
+            </a:p>
+          </p:txBody>
+        </p:sp>
+      </p:grpSp>
+      <p:cxnSp>
+        <p:nvCxnSpPr>
+          <p:cNvPr id="73" name="Verbinder: gekrümmt 72">
+            <a:extLst>
+              <a:ext uri="{FF2B5EF4-FFF2-40B4-BE49-F238E27FC236}">
+                <a16:creationId xmlns:a16="http://schemas.microsoft.com/office/drawing/2014/main" id="{6CB022B4-A207-47EF-B505-E8DD47F724D9}"/>
+              </a:ext>
+            </a:extLst>
+          </p:cNvPr>
+          <p:cNvCxnSpPr>
+            <a:cxnSpLocks/>
+            <a:stCxn id="71" idx="3"/>
+            <a:endCxn id="68" idx="1"/>
+          </p:cNvCxnSpPr>
+          <p:nvPr/>
+        </p:nvCxnSpPr>
+        <p:spPr>
+          <a:xfrm flipV="1">
+            <a:off x="2569547" y="3432810"/>
+            <a:ext cx="660315" cy="3810"/>
+          </a:xfrm>
+          <a:prstGeom prst="curvedConnector3">
+            <a:avLst>
+              <a:gd name="adj1" fmla="val 50000"/>
+            </a:avLst>
+          </a:prstGeom>
+          <a:ln w="28575">
+            <a:solidFill>
+              <a:schemeClr val="tx1"/>
+            </a:solidFill>
+            <a:tailEnd type="triangle"/>
+          </a:ln>
+          <a:effectLst/>
+        </p:spPr>
+        <p:style>
+          <a:lnRef idx="1">
+            <a:schemeClr val="accent1"/>
+          </a:lnRef>
+          <a:fillRef idx="0">
+            <a:schemeClr val="accent1"/>
+          </a:fillRef>
+          <a:effectRef idx="0">
+            <a:schemeClr val="accent1"/>
+          </a:effectRef>
+          <a:fontRef idx="minor">
+            <a:schemeClr val="tx1"/>
+          </a:fontRef>
+        </p:style>
+      </p:cxnSp>
+      <p:cxnSp>
+        <p:nvCxnSpPr>
+          <p:cNvPr id="116" name="Gerader Verbinder 115">
+            <a:extLst>
+              <a:ext uri="{FF2B5EF4-FFF2-40B4-BE49-F238E27FC236}">
+                <a16:creationId xmlns:a16="http://schemas.microsoft.com/office/drawing/2014/main" id="{F824862D-D2E0-42E0-8968-33A827146A3E}"/>
+              </a:ext>
+            </a:extLst>
+          </p:cNvPr>
+          <p:cNvCxnSpPr>
+            <a:cxnSpLocks/>
+            <a:endCxn id="71" idx="0"/>
+          </p:cNvCxnSpPr>
+          <p:nvPr/>
+        </p:nvCxnSpPr>
+        <p:spPr>
+          <a:xfrm flipH="1">
+            <a:off x="1318017" y="2599177"/>
+            <a:ext cx="28610" cy="421945"/>
+          </a:xfrm>
+          <a:prstGeom prst="line">
+            <a:avLst/>
+          </a:prstGeom>
+          <a:ln w="12700">
+            <a:solidFill>
+              <a:schemeClr val="tx1"/>
+            </a:solidFill>
+            <a:prstDash val="dash"/>
+            <a:headEnd type="triangle" w="med" len="med"/>
+            <a:tailEnd type="none" w="med" len="med"/>
+          </a:ln>
+          <a:effectLst/>
+        </p:spPr>
+        <p:style>
+          <a:lnRef idx="1">
+            <a:schemeClr val="accent1"/>
+          </a:lnRef>
+          <a:fillRef idx="0">
+            <a:schemeClr val="accent1"/>
+          </a:fillRef>
+          <a:effectRef idx="0">
+            <a:schemeClr val="accent1"/>
+          </a:effectRef>
+          <a:fontRef idx="minor">
+            <a:schemeClr val="tx1"/>
+          </a:fontRef>
+        </p:style>
+      </p:cxnSp>
+      <p:grpSp>
+        <p:nvGrpSpPr>
+          <p:cNvPr id="159" name="Gruppieren 158">
+            <a:extLst>
+              <a:ext uri="{FF2B5EF4-FFF2-40B4-BE49-F238E27FC236}">
+                <a16:creationId xmlns:a16="http://schemas.microsoft.com/office/drawing/2014/main" id="{999F550C-0151-4BBB-A3BF-2B7571C710DE}"/>
+              </a:ext>
+            </a:extLst>
+          </p:cNvPr>
+          <p:cNvGrpSpPr/>
+          <p:nvPr/>
+        </p:nvGrpSpPr>
+        <p:grpSpPr>
+          <a:xfrm rot="308539">
+            <a:off x="4399582" y="562558"/>
+            <a:ext cx="3964589" cy="2416010"/>
+            <a:chOff x="3595718" y="610076"/>
+            <a:chExt cx="3964589" cy="2416010"/>
+          </a:xfrm>
+          <a:effectLst/>
+        </p:grpSpPr>
+        <p:grpSp>
+          <p:nvGrpSpPr>
+            <p:cNvPr id="123" name="Gruppieren 122">
+              <a:extLst>
+                <a:ext uri="{FF2B5EF4-FFF2-40B4-BE49-F238E27FC236}">
+                  <a16:creationId xmlns:a16="http://schemas.microsoft.com/office/drawing/2014/main" id="{4E466765-F44F-45BC-9751-7506770792C5}"/>
+                </a:ext>
+              </a:extLst>
+            </p:cNvPr>
+            <p:cNvGrpSpPr/>
+            <p:nvPr/>
+          </p:nvGrpSpPr>
+          <p:grpSpPr>
+            <a:xfrm rot="5400000">
+              <a:off x="5788472" y="622331"/>
+              <a:ext cx="1711288" cy="1832383"/>
+              <a:chOff x="-1038941" y="2911425"/>
+              <a:chExt cx="3788208" cy="4056269"/>
+            </a:xfrm>
+          </p:grpSpPr>
+          <p:cxnSp>
+            <p:nvCxnSpPr>
+              <p:cNvPr id="150" name="Gerader Verbinder 149">
+                <a:extLst>
+                  <a:ext uri="{FF2B5EF4-FFF2-40B4-BE49-F238E27FC236}">
+                    <a16:creationId xmlns:a16="http://schemas.microsoft.com/office/drawing/2014/main" id="{C3C3C6DC-84C6-4397-BFE9-1EFEF3C94F79}"/>
+                  </a:ext>
+                </a:extLst>
+              </p:cNvPr>
+              <p:cNvCxnSpPr>
+                <a:cxnSpLocks/>
+              </p:cNvCxnSpPr>
+              <p:nvPr/>
+            </p:nvCxnSpPr>
+            <p:spPr>
+              <a:xfrm rot="16200000" flipV="1">
+                <a:off x="1245842" y="4240587"/>
+                <a:ext cx="441763" cy="412423"/>
+              </a:xfrm>
+              <a:prstGeom prst="line">
+                <a:avLst/>
+              </a:prstGeom>
+              <a:ln w="28575">
+                <a:solidFill>
+                  <a:schemeClr val="bg2"/>
+                </a:solidFill>
+                <a:prstDash val="dash"/>
+              </a:ln>
+            </p:spPr>
+            <p:style>
+              <a:lnRef idx="1">
+                <a:schemeClr val="accent1"/>
+              </a:lnRef>
+              <a:fillRef idx="0">
+                <a:schemeClr val="accent1"/>
+              </a:fillRef>
+              <a:effectRef idx="0">
+                <a:schemeClr val="accent1"/>
+              </a:effectRef>
+              <a:fontRef idx="minor">
+                <a:schemeClr val="tx1"/>
+              </a:fontRef>
+            </p:style>
+          </p:cxnSp>
+          <p:cxnSp>
+            <p:nvCxnSpPr>
+              <p:cNvPr id="151" name="Gerader Verbinder 150">
+                <a:extLst>
+                  <a:ext uri="{FF2B5EF4-FFF2-40B4-BE49-F238E27FC236}">
+                    <a16:creationId xmlns:a16="http://schemas.microsoft.com/office/drawing/2014/main" id="{ACF4CE62-5128-4AD7-984E-E4261DD1CE0D}"/>
+                  </a:ext>
+                </a:extLst>
+              </p:cNvPr>
+              <p:cNvCxnSpPr>
+                <a:cxnSpLocks/>
+              </p:cNvCxnSpPr>
+              <p:nvPr/>
+            </p:nvCxnSpPr>
+            <p:spPr>
+              <a:xfrm rot="16200000" flipH="1">
+                <a:off x="420512" y="3442532"/>
+                <a:ext cx="62055" cy="2442787"/>
+              </a:xfrm>
+              <a:prstGeom prst="line">
+                <a:avLst/>
+              </a:prstGeom>
+              <a:ln w="28575">
+                <a:solidFill>
+                  <a:schemeClr val="bg2"/>
+                </a:solidFill>
+                <a:prstDash val="dash"/>
+              </a:ln>
+            </p:spPr>
+            <p:style>
+              <a:lnRef idx="1">
+                <a:schemeClr val="accent1"/>
+              </a:lnRef>
+              <a:fillRef idx="0">
+                <a:schemeClr val="accent1"/>
+              </a:fillRef>
+              <a:effectRef idx="0">
+                <a:schemeClr val="accent1"/>
+              </a:effectRef>
+              <a:fontRef idx="minor">
+                <a:schemeClr val="tx1"/>
+              </a:fontRef>
+            </p:style>
+          </p:cxnSp>
+          <p:cxnSp>
+            <p:nvCxnSpPr>
+              <p:cNvPr id="152" name="Gerader Verbinder 151">
+                <a:extLst>
+                  <a:ext uri="{FF2B5EF4-FFF2-40B4-BE49-F238E27FC236}">
+                    <a16:creationId xmlns:a16="http://schemas.microsoft.com/office/drawing/2014/main" id="{9FCA41BA-50C1-4C93-AF23-36D8053C6490}"/>
+                  </a:ext>
+                </a:extLst>
+              </p:cNvPr>
+              <p:cNvCxnSpPr>
+                <a:cxnSpLocks/>
+              </p:cNvCxnSpPr>
+              <p:nvPr/>
+            </p:nvCxnSpPr>
+            <p:spPr>
+              <a:xfrm rot="16200000" flipV="1">
+                <a:off x="793528" y="5550122"/>
+                <a:ext cx="2286157" cy="548987"/>
+              </a:xfrm>
+              <a:prstGeom prst="line">
+                <a:avLst/>
+              </a:prstGeom>
+              <a:ln w="28575">
+                <a:solidFill>
+                  <a:schemeClr val="bg2"/>
+                </a:solidFill>
+                <a:prstDash val="dash"/>
+              </a:ln>
+            </p:spPr>
+            <p:style>
+              <a:lnRef idx="1">
+                <a:schemeClr val="accent1"/>
+              </a:lnRef>
+              <a:fillRef idx="0">
+                <a:schemeClr val="accent1"/>
+              </a:fillRef>
+              <a:effectRef idx="0">
+                <a:schemeClr val="accent1"/>
+              </a:effectRef>
+              <a:fontRef idx="minor">
+                <a:schemeClr val="tx1"/>
+              </a:fontRef>
+            </p:style>
+          </p:cxnSp>
+          <p:cxnSp>
+            <p:nvCxnSpPr>
+              <p:cNvPr id="153" name="Gerader Verbinder 152">
+                <a:extLst>
+                  <a:ext uri="{FF2B5EF4-FFF2-40B4-BE49-F238E27FC236}">
+                    <a16:creationId xmlns:a16="http://schemas.microsoft.com/office/drawing/2014/main" id="{39F2F6EE-C33D-41B2-B223-D7755762B74C}"/>
+                  </a:ext>
+                </a:extLst>
+              </p:cNvPr>
+              <p:cNvCxnSpPr>
+                <a:cxnSpLocks/>
+              </p:cNvCxnSpPr>
+              <p:nvPr/>
+            </p:nvCxnSpPr>
+            <p:spPr>
+              <a:xfrm rot="16200000" flipV="1">
+                <a:off x="787879" y="3796481"/>
+                <a:ext cx="1770113" cy="1"/>
+              </a:xfrm>
+              <a:prstGeom prst="line">
+                <a:avLst/>
+              </a:prstGeom>
+              <a:ln w="28575">
+                <a:solidFill>
+                  <a:schemeClr val="bg2"/>
+                </a:solidFill>
+                <a:prstDash val="dash"/>
+              </a:ln>
+            </p:spPr>
+            <p:style>
+              <a:lnRef idx="1">
+                <a:schemeClr val="accent1"/>
+              </a:lnRef>
+              <a:fillRef idx="0">
+                <a:schemeClr val="accent1"/>
+              </a:fillRef>
+              <a:effectRef idx="0">
+                <a:schemeClr val="accent1"/>
+              </a:effectRef>
+              <a:fontRef idx="minor">
+                <a:schemeClr val="tx1"/>
+              </a:fontRef>
+            </p:style>
+          </p:cxnSp>
+          <p:cxnSp>
+            <p:nvCxnSpPr>
+              <p:cNvPr id="154" name="Gerader Verbinder 153">
+                <a:extLst>
+                  <a:ext uri="{FF2B5EF4-FFF2-40B4-BE49-F238E27FC236}">
+                    <a16:creationId xmlns:a16="http://schemas.microsoft.com/office/drawing/2014/main" id="{33567976-7D24-4CD2-B251-82F7BD0412CC}"/>
+                  </a:ext>
+                </a:extLst>
+              </p:cNvPr>
+              <p:cNvCxnSpPr>
+                <a:cxnSpLocks/>
+              </p:cNvCxnSpPr>
+              <p:nvPr/>
+            </p:nvCxnSpPr>
+            <p:spPr>
+              <a:xfrm rot="16200000">
+                <a:off x="1701955" y="4105304"/>
+                <a:ext cx="558032" cy="594434"/>
+              </a:xfrm>
+              <a:prstGeom prst="line">
+                <a:avLst/>
+              </a:prstGeom>
+              <a:ln w="28575">
+                <a:solidFill>
+                  <a:schemeClr val="bg2"/>
+                </a:solidFill>
+                <a:prstDash val="dash"/>
+              </a:ln>
+            </p:spPr>
+            <p:style>
+              <a:lnRef idx="1">
+                <a:schemeClr val="accent1"/>
+              </a:lnRef>
+              <a:fillRef idx="0">
+                <a:schemeClr val="accent1"/>
+              </a:fillRef>
+              <a:effectRef idx="0">
+                <a:schemeClr val="accent1"/>
+              </a:effectRef>
+              <a:fontRef idx="minor">
+                <a:schemeClr val="tx1"/>
+              </a:fontRef>
+            </p:style>
+          </p:cxnSp>
+          <p:cxnSp>
+            <p:nvCxnSpPr>
+              <p:cNvPr id="155" name="Gerader Verbinder 154">
+                <a:extLst>
+                  <a:ext uri="{FF2B5EF4-FFF2-40B4-BE49-F238E27FC236}">
+                    <a16:creationId xmlns:a16="http://schemas.microsoft.com/office/drawing/2014/main" id="{B274056A-5B20-44B7-BCAF-0640EB0E5198}"/>
+                  </a:ext>
+                </a:extLst>
+              </p:cNvPr>
+              <p:cNvCxnSpPr>
+                <a:cxnSpLocks/>
+              </p:cNvCxnSpPr>
+              <p:nvPr/>
+            </p:nvCxnSpPr>
+            <p:spPr>
+              <a:xfrm rot="16200000" flipH="1" flipV="1">
+                <a:off x="-700741" y="4343336"/>
+                <a:ext cx="2035475" cy="2711875"/>
+              </a:xfrm>
+              <a:prstGeom prst="line">
+                <a:avLst/>
+              </a:prstGeom>
+              <a:ln w="28575">
+                <a:solidFill>
+                  <a:schemeClr val="bg2"/>
+                </a:solidFill>
+                <a:prstDash val="dash"/>
+              </a:ln>
+            </p:spPr>
+            <p:style>
+              <a:lnRef idx="1">
+                <a:schemeClr val="accent1"/>
+              </a:lnRef>
+              <a:fillRef idx="0">
+                <a:schemeClr val="accent1"/>
+              </a:fillRef>
+              <a:effectRef idx="0">
+                <a:schemeClr val="accent1"/>
+              </a:effectRef>
+              <a:fontRef idx="minor">
+                <a:schemeClr val="tx1"/>
+              </a:fontRef>
+            </p:style>
+          </p:cxnSp>
+          <p:cxnSp>
+            <p:nvCxnSpPr>
+              <p:cNvPr id="156" name="Gerader Verbinder 155">
+                <a:extLst>
+                  <a:ext uri="{FF2B5EF4-FFF2-40B4-BE49-F238E27FC236}">
+                    <a16:creationId xmlns:a16="http://schemas.microsoft.com/office/drawing/2014/main" id="{0E537E15-6539-484E-A311-9CAAA10F93C7}"/>
+                  </a:ext>
+                </a:extLst>
+              </p:cNvPr>
+              <p:cNvCxnSpPr>
+                <a:cxnSpLocks/>
+              </p:cNvCxnSpPr>
+              <p:nvPr/>
+            </p:nvCxnSpPr>
+            <p:spPr>
+              <a:xfrm rot="16200000" flipH="1">
+                <a:off x="1704559" y="4649911"/>
+                <a:ext cx="289941" cy="353191"/>
+              </a:xfrm>
+              <a:prstGeom prst="line">
+                <a:avLst/>
+              </a:prstGeom>
+              <a:ln w="28575">
+                <a:solidFill>
+                  <a:schemeClr val="bg2"/>
+                </a:solidFill>
+                <a:prstDash val="dash"/>
+              </a:ln>
+            </p:spPr>
+            <p:style>
+              <a:lnRef idx="1">
+                <a:schemeClr val="accent1"/>
+              </a:lnRef>
+              <a:fillRef idx="0">
+                <a:schemeClr val="accent1"/>
+              </a:fillRef>
+              <a:effectRef idx="0">
+                <a:schemeClr val="accent1"/>
+              </a:effectRef>
+              <a:fontRef idx="minor">
+                <a:schemeClr val="tx1"/>
+              </a:fontRef>
+            </p:style>
+          </p:cxnSp>
+          <p:cxnSp>
+            <p:nvCxnSpPr>
+              <p:cNvPr id="157" name="Gerader Verbinder 156">
+                <a:extLst>
+                  <a:ext uri="{FF2B5EF4-FFF2-40B4-BE49-F238E27FC236}">
+                    <a16:creationId xmlns:a16="http://schemas.microsoft.com/office/drawing/2014/main" id="{3D6940CF-4A41-498E-8C8E-8CAB28C9A7BA}"/>
+                  </a:ext>
+                </a:extLst>
+              </p:cNvPr>
+              <p:cNvCxnSpPr>
+                <a:cxnSpLocks/>
+              </p:cNvCxnSpPr>
+              <p:nvPr/>
+            </p:nvCxnSpPr>
+            <p:spPr>
+              <a:xfrm rot="16200000">
+                <a:off x="2209435" y="4141705"/>
+                <a:ext cx="3330" cy="1076334"/>
+              </a:xfrm>
+              <a:prstGeom prst="line">
+                <a:avLst/>
+              </a:prstGeom>
+              <a:ln w="28575">
+                <a:solidFill>
+                  <a:schemeClr val="bg2"/>
+                </a:solidFill>
+                <a:prstDash val="dash"/>
+              </a:ln>
+            </p:spPr>
+            <p:style>
+              <a:lnRef idx="1">
+                <a:schemeClr val="accent1"/>
+              </a:lnRef>
+              <a:fillRef idx="0">
+                <a:schemeClr val="accent1"/>
+              </a:fillRef>
+              <a:effectRef idx="0">
+                <a:schemeClr val="accent1"/>
+              </a:effectRef>
+              <a:fontRef idx="minor">
+                <a:schemeClr val="tx1"/>
+              </a:fontRef>
+            </p:style>
+          </p:cxnSp>
+        </p:grpSp>
+        <p:grpSp>
+          <p:nvGrpSpPr>
+            <p:cNvPr id="124" name="Gruppieren 123">
+              <a:extLst>
+                <a:ext uri="{FF2B5EF4-FFF2-40B4-BE49-F238E27FC236}">
+                  <a16:creationId xmlns:a16="http://schemas.microsoft.com/office/drawing/2014/main" id="{6BD15B0A-E681-4298-9803-FB86E03E0E5B}"/>
+                </a:ext>
+              </a:extLst>
+            </p:cNvPr>
+            <p:cNvGrpSpPr/>
+            <p:nvPr/>
+          </p:nvGrpSpPr>
+          <p:grpSpPr>
+            <a:xfrm rot="5400000">
+              <a:off x="5065646" y="-60227"/>
+              <a:ext cx="1582364" cy="2922970"/>
+              <a:chOff x="666758" y="585291"/>
+              <a:chExt cx="3502814" cy="6470457"/>
+            </a:xfrm>
+          </p:grpSpPr>
+          <p:cxnSp>
+            <p:nvCxnSpPr>
+              <p:cNvPr id="142" name="Gerader Verbinder 141">
+                <a:extLst>
+                  <a:ext uri="{FF2B5EF4-FFF2-40B4-BE49-F238E27FC236}">
+                    <a16:creationId xmlns:a16="http://schemas.microsoft.com/office/drawing/2014/main" id="{4EB7BF8A-BFCD-46B1-972F-4553FDFB8F57}"/>
+                  </a:ext>
+                </a:extLst>
+              </p:cNvPr>
+              <p:cNvCxnSpPr>
+                <a:cxnSpLocks/>
+              </p:cNvCxnSpPr>
+              <p:nvPr/>
+            </p:nvCxnSpPr>
+            <p:spPr>
+              <a:xfrm rot="16200000" flipV="1">
+                <a:off x="736592" y="3731339"/>
+                <a:ext cx="1078800" cy="793883"/>
+              </a:xfrm>
+              <a:prstGeom prst="line">
+                <a:avLst/>
+              </a:prstGeom>
+              <a:ln w="28575">
+                <a:solidFill>
+                  <a:schemeClr val="bg2"/>
+                </a:solidFill>
+                <a:prstDash val="dash"/>
+              </a:ln>
+            </p:spPr>
+            <p:style>
+              <a:lnRef idx="1">
+                <a:schemeClr val="accent1"/>
+              </a:lnRef>
+              <a:fillRef idx="0">
+                <a:schemeClr val="accent1"/>
+              </a:fillRef>
+              <a:effectRef idx="0">
+                <a:schemeClr val="accent1"/>
+              </a:effectRef>
+              <a:fontRef idx="minor">
+                <a:schemeClr val="tx1"/>
+              </a:fontRef>
+            </p:style>
+          </p:cxnSp>
+          <p:cxnSp>
+            <p:nvCxnSpPr>
+              <p:cNvPr id="143" name="Gerader Verbinder 142">
+                <a:extLst>
+                  <a:ext uri="{FF2B5EF4-FFF2-40B4-BE49-F238E27FC236}">
+                    <a16:creationId xmlns:a16="http://schemas.microsoft.com/office/drawing/2014/main" id="{C77B27F3-0228-4483-B4D6-979D37A623BC}"/>
+                  </a:ext>
+                </a:extLst>
+              </p:cNvPr>
+              <p:cNvCxnSpPr>
+                <a:cxnSpLocks/>
+              </p:cNvCxnSpPr>
+              <p:nvPr/>
+            </p:nvCxnSpPr>
+            <p:spPr>
+              <a:xfrm rot="16200000">
+                <a:off x="1170095" y="4198817"/>
+                <a:ext cx="6702" cy="998974"/>
+              </a:xfrm>
+              <a:prstGeom prst="line">
+                <a:avLst/>
+              </a:prstGeom>
+              <a:ln w="28575">
+                <a:solidFill>
+                  <a:schemeClr val="bg2"/>
+                </a:solidFill>
+                <a:prstDash val="dash"/>
+              </a:ln>
+            </p:spPr>
+            <p:style>
+              <a:lnRef idx="1">
+                <a:schemeClr val="accent1"/>
+              </a:lnRef>
+              <a:fillRef idx="0">
+                <a:schemeClr val="accent1"/>
+              </a:fillRef>
+              <a:effectRef idx="0">
+                <a:schemeClr val="accent1"/>
+              </a:effectRef>
+              <a:fontRef idx="minor">
+                <a:schemeClr val="tx1"/>
+              </a:fontRef>
+            </p:style>
+          </p:cxnSp>
+          <p:cxnSp>
+            <p:nvCxnSpPr>
+              <p:cNvPr id="144" name="Gerader Verbinder 143">
+                <a:extLst>
+                  <a:ext uri="{FF2B5EF4-FFF2-40B4-BE49-F238E27FC236}">
+                    <a16:creationId xmlns:a16="http://schemas.microsoft.com/office/drawing/2014/main" id="{05C0D18E-595A-4875-91BD-0E29DFD395C3}"/>
+                  </a:ext>
+                </a:extLst>
+              </p:cNvPr>
+              <p:cNvCxnSpPr>
+                <a:cxnSpLocks/>
+              </p:cNvCxnSpPr>
+              <p:nvPr/>
+            </p:nvCxnSpPr>
+            <p:spPr>
+              <a:xfrm rot="16200000">
+                <a:off x="397803" y="5791439"/>
+                <a:ext cx="2374211" cy="154408"/>
+              </a:xfrm>
+              <a:prstGeom prst="line">
+                <a:avLst/>
+              </a:prstGeom>
+              <a:ln w="28575">
+                <a:solidFill>
+                  <a:schemeClr val="bg2"/>
+                </a:solidFill>
+                <a:prstDash val="dash"/>
+              </a:ln>
+            </p:spPr>
+            <p:style>
+              <a:lnRef idx="1">
+                <a:schemeClr val="accent1"/>
+              </a:lnRef>
+              <a:fillRef idx="0">
+                <a:schemeClr val="accent1"/>
+              </a:fillRef>
+              <a:effectRef idx="0">
+                <a:schemeClr val="accent1"/>
+              </a:effectRef>
+              <a:fontRef idx="minor">
+                <a:schemeClr val="tx1"/>
+              </a:fontRef>
+            </p:style>
+          </p:cxnSp>
+          <p:cxnSp>
+            <p:nvCxnSpPr>
+              <p:cNvPr id="145" name="Gerader Verbinder 144">
+                <a:extLst>
+                  <a:ext uri="{FF2B5EF4-FFF2-40B4-BE49-F238E27FC236}">
+                    <a16:creationId xmlns:a16="http://schemas.microsoft.com/office/drawing/2014/main" id="{09223702-68AC-4378-BC35-4F6C06AAB13D}"/>
+                  </a:ext>
+                </a:extLst>
+              </p:cNvPr>
+              <p:cNvCxnSpPr>
+                <a:cxnSpLocks/>
+              </p:cNvCxnSpPr>
+              <p:nvPr/>
+            </p:nvCxnSpPr>
+            <p:spPr>
+              <a:xfrm rot="16200000" flipV="1">
+                <a:off x="-753663" y="2254942"/>
+                <a:ext cx="4096247" cy="756945"/>
+              </a:xfrm>
+              <a:prstGeom prst="line">
+                <a:avLst/>
+              </a:prstGeom>
+              <a:ln w="28575">
+                <a:solidFill>
+                  <a:schemeClr val="bg2"/>
+                </a:solidFill>
+                <a:prstDash val="dash"/>
+              </a:ln>
+            </p:spPr>
+            <p:style>
+              <a:lnRef idx="1">
+                <a:schemeClr val="accent1"/>
+              </a:lnRef>
+              <a:fillRef idx="0">
+                <a:schemeClr val="accent1"/>
+              </a:fillRef>
+              <a:effectRef idx="0">
+                <a:schemeClr val="accent1"/>
+              </a:effectRef>
+              <a:fontRef idx="minor">
+                <a:schemeClr val="tx1"/>
+              </a:fontRef>
+            </p:style>
+          </p:cxnSp>
+          <p:cxnSp>
+            <p:nvCxnSpPr>
+              <p:cNvPr id="146" name="Gerader Verbinder 145">
+                <a:extLst>
+                  <a:ext uri="{FF2B5EF4-FFF2-40B4-BE49-F238E27FC236}">
+                    <a16:creationId xmlns:a16="http://schemas.microsoft.com/office/drawing/2014/main" id="{2094E1E5-D168-4C7F-B1F6-48645476FFAC}"/>
+                  </a:ext>
+                </a:extLst>
+              </p:cNvPr>
+              <p:cNvCxnSpPr>
+                <a:cxnSpLocks/>
+              </p:cNvCxnSpPr>
+              <p:nvPr/>
+            </p:nvCxnSpPr>
+            <p:spPr>
+              <a:xfrm rot="16200000">
+                <a:off x="1201076" y="2303316"/>
+                <a:ext cx="2860898" cy="1895544"/>
+              </a:xfrm>
+              <a:prstGeom prst="line">
+                <a:avLst/>
+              </a:prstGeom>
+              <a:ln w="28575">
+                <a:solidFill>
+                  <a:schemeClr val="bg2"/>
+                </a:solidFill>
+                <a:prstDash val="dash"/>
+              </a:ln>
+            </p:spPr>
+            <p:style>
+              <a:lnRef idx="1">
+                <a:schemeClr val="accent1"/>
+              </a:lnRef>
+              <a:fillRef idx="0">
+                <a:schemeClr val="accent1"/>
+              </a:fillRef>
+              <a:effectRef idx="0">
+                <a:schemeClr val="accent1"/>
+              </a:effectRef>
+              <a:fontRef idx="minor">
+                <a:schemeClr val="tx1"/>
+              </a:fontRef>
+            </p:style>
+          </p:cxnSp>
+          <p:cxnSp>
+            <p:nvCxnSpPr>
+              <p:cNvPr id="147" name="Gerader Verbinder 146">
+                <a:extLst>
+                  <a:ext uri="{FF2B5EF4-FFF2-40B4-BE49-F238E27FC236}">
+                    <a16:creationId xmlns:a16="http://schemas.microsoft.com/office/drawing/2014/main" id="{3694CDD9-AE1B-49BF-AB7F-31DB9B4B6025}"/>
+                  </a:ext>
+                </a:extLst>
+              </p:cNvPr>
+              <p:cNvCxnSpPr>
+                <a:cxnSpLocks/>
+              </p:cNvCxnSpPr>
+              <p:nvPr/>
+            </p:nvCxnSpPr>
+            <p:spPr>
+              <a:xfrm flipH="1">
+                <a:off x="666758" y="4681537"/>
+                <a:ext cx="1006175" cy="811722"/>
+              </a:xfrm>
+              <a:prstGeom prst="line">
+                <a:avLst/>
+              </a:prstGeom>
+              <a:ln w="28575">
+                <a:solidFill>
+                  <a:schemeClr val="bg2"/>
+                </a:solidFill>
+                <a:prstDash val="dash"/>
+              </a:ln>
+            </p:spPr>
+            <p:style>
+              <a:lnRef idx="1">
+                <a:schemeClr val="accent1"/>
+              </a:lnRef>
+              <a:fillRef idx="0">
+                <a:schemeClr val="accent1"/>
+              </a:fillRef>
+              <a:effectRef idx="0">
+                <a:schemeClr val="accent1"/>
+              </a:effectRef>
+              <a:fontRef idx="minor">
+                <a:schemeClr val="tx1"/>
+              </a:fontRef>
+            </p:style>
+          </p:cxnSp>
+          <p:cxnSp>
+            <p:nvCxnSpPr>
+              <p:cNvPr id="148" name="Gerader Verbinder 147">
+                <a:extLst>
+                  <a:ext uri="{FF2B5EF4-FFF2-40B4-BE49-F238E27FC236}">
+                    <a16:creationId xmlns:a16="http://schemas.microsoft.com/office/drawing/2014/main" id="{B737261E-F618-4CF7-A70F-E355963531CB}"/>
+                  </a:ext>
+                </a:extLst>
+              </p:cNvPr>
+              <p:cNvCxnSpPr>
+                <a:cxnSpLocks/>
+              </p:cNvCxnSpPr>
+              <p:nvPr/>
+            </p:nvCxnSpPr>
+            <p:spPr>
+              <a:xfrm rot="16200000" flipH="1">
+                <a:off x="1826504" y="4527967"/>
+                <a:ext cx="2189497" cy="2496638"/>
+              </a:xfrm>
+              <a:prstGeom prst="line">
+                <a:avLst/>
+              </a:prstGeom>
+              <a:ln w="28575">
+                <a:solidFill>
+                  <a:schemeClr val="bg2"/>
+                </a:solidFill>
+                <a:prstDash val="dash"/>
+              </a:ln>
+            </p:spPr>
+            <p:style>
+              <a:lnRef idx="1">
+                <a:schemeClr val="accent1"/>
+              </a:lnRef>
+              <a:fillRef idx="0">
+                <a:schemeClr val="accent1"/>
+              </a:fillRef>
+              <a:effectRef idx="0">
+                <a:schemeClr val="accent1"/>
+              </a:effectRef>
+              <a:fontRef idx="minor">
+                <a:schemeClr val="tx1"/>
+              </a:fontRef>
+            </p:style>
+          </p:cxnSp>
+          <p:cxnSp>
+            <p:nvCxnSpPr>
+              <p:cNvPr id="149" name="Gerader Verbinder 148">
+                <a:extLst>
+                  <a:ext uri="{FF2B5EF4-FFF2-40B4-BE49-F238E27FC236}">
+                    <a16:creationId xmlns:a16="http://schemas.microsoft.com/office/drawing/2014/main" id="{52CF2C5E-3E59-4719-9B2C-35C2388000D4}"/>
+                  </a:ext>
+                </a:extLst>
+              </p:cNvPr>
+              <p:cNvCxnSpPr>
+                <a:cxnSpLocks/>
+              </p:cNvCxnSpPr>
+              <p:nvPr/>
+            </p:nvCxnSpPr>
+            <p:spPr>
+              <a:xfrm rot="16200000">
+                <a:off x="2209435" y="4141705"/>
+                <a:ext cx="3330" cy="1076334"/>
+              </a:xfrm>
+              <a:prstGeom prst="line">
+                <a:avLst/>
+              </a:prstGeom>
+              <a:ln w="28575">
+                <a:solidFill>
+                  <a:schemeClr val="bg2"/>
+                </a:solidFill>
+                <a:prstDash val="dash"/>
+              </a:ln>
+            </p:spPr>
+            <p:style>
+              <a:lnRef idx="1">
+                <a:schemeClr val="accent1"/>
+              </a:lnRef>
+              <a:fillRef idx="0">
+                <a:schemeClr val="accent1"/>
+              </a:fillRef>
+              <a:effectRef idx="0">
+                <a:schemeClr val="accent1"/>
+              </a:effectRef>
+              <a:fontRef idx="minor">
+                <a:schemeClr val="tx1"/>
+              </a:fontRef>
+            </p:style>
+          </p:cxnSp>
+        </p:grpSp>
+        <p:grpSp>
+          <p:nvGrpSpPr>
+            <p:cNvPr id="125" name="Gruppieren 124">
+              <a:extLst>
+                <a:ext uri="{FF2B5EF4-FFF2-40B4-BE49-F238E27FC236}">
+                  <a16:creationId xmlns:a16="http://schemas.microsoft.com/office/drawing/2014/main" id="{2C6E2B37-AAD6-462D-B68D-0BBDE683E6EE}"/>
+                </a:ext>
+              </a:extLst>
+            </p:cNvPr>
+            <p:cNvGrpSpPr/>
+            <p:nvPr/>
+          </p:nvGrpSpPr>
+          <p:grpSpPr>
+            <a:xfrm>
+              <a:off x="3595718" y="932616"/>
+              <a:ext cx="1904092" cy="2093470"/>
+              <a:chOff x="217291" y="2155449"/>
+              <a:chExt cx="4215009" cy="4634227"/>
+            </a:xfrm>
+          </p:grpSpPr>
+          <p:cxnSp>
+            <p:nvCxnSpPr>
+              <p:cNvPr id="134" name="Gerader Verbinder 133">
+                <a:extLst>
+                  <a:ext uri="{FF2B5EF4-FFF2-40B4-BE49-F238E27FC236}">
+                    <a16:creationId xmlns:a16="http://schemas.microsoft.com/office/drawing/2014/main" id="{884BD781-C01B-46B5-9DBC-1268DD927514}"/>
+                  </a:ext>
+                </a:extLst>
+              </p:cNvPr>
+              <p:cNvCxnSpPr>
+                <a:cxnSpLocks/>
+              </p:cNvCxnSpPr>
+              <p:nvPr/>
+            </p:nvCxnSpPr>
+            <p:spPr>
+              <a:xfrm flipH="1" flipV="1">
+                <a:off x="224532" y="2155449"/>
+                <a:ext cx="1448401" cy="2512232"/>
+              </a:xfrm>
+              <a:prstGeom prst="line">
+                <a:avLst/>
+              </a:prstGeom>
+              <a:ln w="28575">
+                <a:solidFill>
+                  <a:schemeClr val="bg2"/>
+                </a:solidFill>
+                <a:prstDash val="dash"/>
+              </a:ln>
+            </p:spPr>
+            <p:style>
+              <a:lnRef idx="1">
+                <a:schemeClr val="accent1"/>
+              </a:lnRef>
+              <a:fillRef idx="0">
+                <a:schemeClr val="accent1"/>
+              </a:fillRef>
+              <a:effectRef idx="0">
+                <a:schemeClr val="accent1"/>
+              </a:effectRef>
+              <a:fontRef idx="minor">
+                <a:schemeClr val="tx1"/>
+              </a:fontRef>
+            </p:style>
+          </p:cxnSp>
+          <p:cxnSp>
+            <p:nvCxnSpPr>
+              <p:cNvPr id="135" name="Gerader Verbinder 134">
+                <a:extLst>
+                  <a:ext uri="{FF2B5EF4-FFF2-40B4-BE49-F238E27FC236}">
+                    <a16:creationId xmlns:a16="http://schemas.microsoft.com/office/drawing/2014/main" id="{0024CC95-8A35-4541-9F5B-0A37B8608763}"/>
+                  </a:ext>
+                </a:extLst>
+              </p:cNvPr>
+              <p:cNvCxnSpPr>
+                <a:cxnSpLocks/>
+              </p:cNvCxnSpPr>
+              <p:nvPr/>
+            </p:nvCxnSpPr>
+            <p:spPr>
+              <a:xfrm flipV="1">
+                <a:off x="217291" y="4694953"/>
+                <a:ext cx="1455642" cy="68902"/>
+              </a:xfrm>
+              <a:prstGeom prst="line">
+                <a:avLst/>
+              </a:prstGeom>
+              <a:ln w="28575">
+                <a:solidFill>
+                  <a:schemeClr val="bg2"/>
+                </a:solidFill>
+                <a:prstDash val="dash"/>
+              </a:ln>
+            </p:spPr>
+            <p:style>
+              <a:lnRef idx="1">
+                <a:schemeClr val="accent1"/>
+              </a:lnRef>
+              <a:fillRef idx="0">
+                <a:schemeClr val="accent1"/>
+              </a:fillRef>
+              <a:effectRef idx="0">
+                <a:schemeClr val="accent1"/>
+              </a:effectRef>
+              <a:fontRef idx="minor">
+                <a:schemeClr val="tx1"/>
+              </a:fontRef>
+            </p:style>
+          </p:cxnSp>
+          <p:cxnSp>
+            <p:nvCxnSpPr>
+              <p:cNvPr id="136" name="Gerader Verbinder 135">
+                <a:extLst>
+                  <a:ext uri="{FF2B5EF4-FFF2-40B4-BE49-F238E27FC236}">
+                    <a16:creationId xmlns:a16="http://schemas.microsoft.com/office/drawing/2014/main" id="{0902C48F-628B-4EDB-8780-97D9276E5EAD}"/>
+                  </a:ext>
+                </a:extLst>
+              </p:cNvPr>
+              <p:cNvCxnSpPr>
+                <a:cxnSpLocks/>
+              </p:cNvCxnSpPr>
+              <p:nvPr/>
+            </p:nvCxnSpPr>
+            <p:spPr>
+              <a:xfrm flipV="1">
+                <a:off x="672330" y="4681538"/>
+                <a:ext cx="989783" cy="2108138"/>
+              </a:xfrm>
+              <a:prstGeom prst="line">
+                <a:avLst/>
+              </a:prstGeom>
+              <a:ln w="28575">
+                <a:solidFill>
+                  <a:schemeClr val="bg2"/>
+                </a:solidFill>
+                <a:prstDash val="dash"/>
+              </a:ln>
+            </p:spPr>
+            <p:style>
+              <a:lnRef idx="1">
+                <a:schemeClr val="accent1"/>
+              </a:lnRef>
+              <a:fillRef idx="0">
+                <a:schemeClr val="accent1"/>
+              </a:fillRef>
+              <a:effectRef idx="0">
+                <a:schemeClr val="accent1"/>
+              </a:effectRef>
+              <a:fontRef idx="minor">
+                <a:schemeClr val="tx1"/>
+              </a:fontRef>
+            </p:style>
+          </p:cxnSp>
+          <p:cxnSp>
+            <p:nvCxnSpPr>
+              <p:cNvPr id="137" name="Gerader Verbinder 136">
+                <a:extLst>
+                  <a:ext uri="{FF2B5EF4-FFF2-40B4-BE49-F238E27FC236}">
+                    <a16:creationId xmlns:a16="http://schemas.microsoft.com/office/drawing/2014/main" id="{0A904ACF-CAEF-4824-B323-EF8068F647D6}"/>
+                  </a:ext>
+                </a:extLst>
+              </p:cNvPr>
+              <p:cNvCxnSpPr>
+                <a:cxnSpLocks/>
+              </p:cNvCxnSpPr>
+              <p:nvPr/>
+            </p:nvCxnSpPr>
+            <p:spPr>
+              <a:xfrm flipV="1">
+                <a:off x="1672933" y="2604612"/>
+                <a:ext cx="0" cy="2076926"/>
+              </a:xfrm>
+              <a:prstGeom prst="line">
+                <a:avLst/>
+              </a:prstGeom>
+              <a:ln w="28575">
+                <a:solidFill>
+                  <a:schemeClr val="bg2"/>
+                </a:solidFill>
+                <a:prstDash val="dash"/>
+              </a:ln>
+            </p:spPr>
+            <p:style>
+              <a:lnRef idx="1">
+                <a:schemeClr val="accent1"/>
+              </a:lnRef>
+              <a:fillRef idx="0">
+                <a:schemeClr val="accent1"/>
+              </a:fillRef>
+              <a:effectRef idx="0">
+                <a:schemeClr val="accent1"/>
+              </a:effectRef>
+              <a:fontRef idx="minor">
+                <a:schemeClr val="tx1"/>
+              </a:fontRef>
+            </p:style>
+          </p:cxnSp>
+          <p:cxnSp>
+            <p:nvCxnSpPr>
+              <p:cNvPr id="138" name="Gerader Verbinder 137">
+                <a:extLst>
+                  <a:ext uri="{FF2B5EF4-FFF2-40B4-BE49-F238E27FC236}">
+                    <a16:creationId xmlns:a16="http://schemas.microsoft.com/office/drawing/2014/main" id="{F2C59D42-AC4F-47D2-9821-383CD789E833}"/>
+                  </a:ext>
+                </a:extLst>
+              </p:cNvPr>
+              <p:cNvCxnSpPr>
+                <a:cxnSpLocks/>
+              </p:cNvCxnSpPr>
+              <p:nvPr/>
+            </p:nvCxnSpPr>
+            <p:spPr>
+              <a:xfrm flipV="1">
+                <a:off x="1683753" y="2483868"/>
+                <a:ext cx="2675243" cy="2197669"/>
+              </a:xfrm>
+              <a:prstGeom prst="line">
+                <a:avLst/>
+              </a:prstGeom>
+              <a:ln w="28575">
+                <a:solidFill>
+                  <a:schemeClr val="bg2"/>
+                </a:solidFill>
+                <a:prstDash val="dash"/>
+              </a:ln>
+            </p:spPr>
+            <p:style>
+              <a:lnRef idx="1">
+                <a:schemeClr val="accent1"/>
+              </a:lnRef>
+              <a:fillRef idx="0">
+                <a:schemeClr val="accent1"/>
+              </a:fillRef>
+              <a:effectRef idx="0">
+                <a:schemeClr val="accent1"/>
+              </a:effectRef>
+              <a:fontRef idx="minor">
+                <a:schemeClr val="tx1"/>
+              </a:fontRef>
+            </p:style>
+          </p:cxnSp>
+          <p:cxnSp>
+            <p:nvCxnSpPr>
+              <p:cNvPr id="139" name="Gerader Verbinder 138">
+                <a:extLst>
+                  <a:ext uri="{FF2B5EF4-FFF2-40B4-BE49-F238E27FC236}">
+                    <a16:creationId xmlns:a16="http://schemas.microsoft.com/office/drawing/2014/main" id="{FD77F3E9-63AF-444A-A5C6-ED737CB6E8A7}"/>
+                  </a:ext>
+                </a:extLst>
+              </p:cNvPr>
+              <p:cNvCxnSpPr>
+                <a:cxnSpLocks/>
+              </p:cNvCxnSpPr>
+              <p:nvPr/>
+            </p:nvCxnSpPr>
+            <p:spPr>
+              <a:xfrm flipH="1">
+                <a:off x="666758" y="4681537"/>
+                <a:ext cx="1006175" cy="811722"/>
+              </a:xfrm>
+              <a:prstGeom prst="line">
+                <a:avLst/>
+              </a:prstGeom>
+              <a:ln w="28575">
+                <a:solidFill>
+                  <a:schemeClr val="bg2"/>
+                </a:solidFill>
+                <a:prstDash val="dash"/>
+              </a:ln>
+            </p:spPr>
+            <p:style>
+              <a:lnRef idx="1">
+                <a:schemeClr val="accent1"/>
+              </a:lnRef>
+              <a:fillRef idx="0">
+                <a:schemeClr val="accent1"/>
+              </a:fillRef>
+              <a:effectRef idx="0">
+                <a:schemeClr val="accent1"/>
+              </a:effectRef>
+              <a:fontRef idx="minor">
+                <a:schemeClr val="tx1"/>
+              </a:fontRef>
+            </p:style>
+          </p:cxnSp>
+          <p:cxnSp>
+            <p:nvCxnSpPr>
+              <p:cNvPr id="140" name="Gerader Verbinder 139">
+                <a:extLst>
+                  <a:ext uri="{FF2B5EF4-FFF2-40B4-BE49-F238E27FC236}">
+                    <a16:creationId xmlns:a16="http://schemas.microsoft.com/office/drawing/2014/main" id="{E3812168-893D-4916-847E-9B1690117A51}"/>
+                  </a:ext>
+                </a:extLst>
+              </p:cNvPr>
+              <p:cNvCxnSpPr>
+                <a:cxnSpLocks/>
+              </p:cNvCxnSpPr>
+              <p:nvPr/>
+            </p:nvCxnSpPr>
+            <p:spPr>
+              <a:xfrm>
+                <a:off x="1672933" y="4681538"/>
+                <a:ext cx="632649" cy="525462"/>
+              </a:xfrm>
+              <a:prstGeom prst="line">
+                <a:avLst/>
+              </a:prstGeom>
+              <a:ln w="28575">
+                <a:solidFill>
+                  <a:schemeClr val="bg2"/>
+                </a:solidFill>
+                <a:prstDash val="dash"/>
+              </a:ln>
+            </p:spPr>
+            <p:style>
+              <a:lnRef idx="1">
+                <a:schemeClr val="accent1"/>
+              </a:lnRef>
+              <a:fillRef idx="0">
+                <a:schemeClr val="accent1"/>
+              </a:fillRef>
+              <a:effectRef idx="0">
+                <a:schemeClr val="accent1"/>
+              </a:effectRef>
+              <a:fontRef idx="minor">
+                <a:schemeClr val="tx1"/>
+              </a:fontRef>
+            </p:style>
+          </p:cxnSp>
+          <p:cxnSp>
+            <p:nvCxnSpPr>
+              <p:cNvPr id="141" name="Gerader Verbinder 140">
+                <a:extLst>
+                  <a:ext uri="{FF2B5EF4-FFF2-40B4-BE49-F238E27FC236}">
+                    <a16:creationId xmlns:a16="http://schemas.microsoft.com/office/drawing/2014/main" id="{B4542598-DC09-4772-A112-3CFE71A036D9}"/>
+                  </a:ext>
+                </a:extLst>
+              </p:cNvPr>
+              <p:cNvCxnSpPr>
+                <a:cxnSpLocks/>
+              </p:cNvCxnSpPr>
+              <p:nvPr/>
+            </p:nvCxnSpPr>
+            <p:spPr>
+              <a:xfrm>
+                <a:off x="1672933" y="4681538"/>
+                <a:ext cx="2759367" cy="82316"/>
+              </a:xfrm>
+              <a:prstGeom prst="line">
+                <a:avLst/>
+              </a:prstGeom>
+              <a:ln w="28575">
+                <a:solidFill>
+                  <a:schemeClr val="bg2"/>
+                </a:solidFill>
+                <a:prstDash val="dash"/>
+              </a:ln>
+            </p:spPr>
+            <p:style>
+              <a:lnRef idx="1">
+                <a:schemeClr val="accent1"/>
+              </a:lnRef>
+              <a:fillRef idx="0">
+                <a:schemeClr val="accent1"/>
+              </a:fillRef>
+              <a:effectRef idx="0">
+                <a:schemeClr val="accent1"/>
+              </a:effectRef>
+              <a:fontRef idx="minor">
+                <a:schemeClr val="tx1"/>
+              </a:fontRef>
+            </p:style>
+          </p:cxnSp>
+        </p:grpSp>
+        <p:sp>
+          <p:nvSpPr>
+            <p:cNvPr id="126" name="Ellipse 125">
+              <a:extLst>
+                <a:ext uri="{FF2B5EF4-FFF2-40B4-BE49-F238E27FC236}">
+                  <a16:creationId xmlns:a16="http://schemas.microsoft.com/office/drawing/2014/main" id="{71275AF3-C795-4A63-99C3-9D373F8F0F16}"/>
+                </a:ext>
+              </a:extLst>
+            </p:cNvPr>
+            <p:cNvSpPr/>
+            <p:nvPr/>
+          </p:nvSpPr>
+          <p:spPr>
+            <a:xfrm>
+              <a:off x="4180903" y="2001022"/>
+              <a:ext cx="142051" cy="142051"/>
+            </a:xfrm>
+            <a:prstGeom prst="ellipse">
+              <a:avLst/>
+            </a:prstGeom>
+            <a:solidFill>
+              <a:srgbClr val="FFA500"/>
+            </a:solidFill>
+            <a:ln>
+              <a:noFill/>
+            </a:ln>
+          </p:spPr>
+          <p:style>
+            <a:lnRef idx="2">
+              <a:schemeClr val="accent1">
+                <a:shade val="50000"/>
+              </a:schemeClr>
+            </a:lnRef>
+            <a:fillRef idx="1">
+              <a:schemeClr val="accent1"/>
+            </a:fillRef>
+            <a:effectRef idx="0">
+              <a:schemeClr val="accent1"/>
+            </a:effectRef>
+            <a:fontRef idx="minor">
+              <a:schemeClr val="lt1"/>
+            </a:fontRef>
+          </p:style>
+          <p:txBody>
+            <a:bodyPr rtlCol="0" anchor="ctr"/>
+            <a:lstStyle/>
+            <a:p>
+              <a:pPr algn="ctr"/>
+              <a:endParaRPr lang="de-CH" dirty="0">
+                <a:latin typeface="Arial" panose="020B0604020202020204" pitchFamily="34" charset="0"/>
+                <a:cs typeface="Arial" panose="020B0604020202020204" pitchFamily="34" charset="0"/>
+              </a:endParaRPr>
+            </a:p>
+          </p:txBody>
+        </p:sp>
+        <p:cxnSp>
+          <p:nvCxnSpPr>
+            <p:cNvPr id="127" name="Gerader Verbinder 126">
+              <a:extLst>
+                <a:ext uri="{FF2B5EF4-FFF2-40B4-BE49-F238E27FC236}">
+                  <a16:creationId xmlns:a16="http://schemas.microsoft.com/office/drawing/2014/main" id="{3FE8F9CD-D19E-44FC-A5DB-92A0865C1278}"/>
+                </a:ext>
+              </a:extLst>
+            </p:cNvPr>
+            <p:cNvCxnSpPr>
+              <a:cxnSpLocks/>
+            </p:cNvCxnSpPr>
+            <p:nvPr/>
+          </p:nvCxnSpPr>
+          <p:spPr>
+            <a:xfrm flipV="1">
+              <a:off x="4258178" y="1080976"/>
+              <a:ext cx="1208517" cy="992777"/>
+            </a:xfrm>
+            <a:prstGeom prst="line">
+              <a:avLst/>
+            </a:prstGeom>
+            <a:ln w="28575">
+              <a:solidFill>
+                <a:srgbClr val="FFA500"/>
+              </a:solidFill>
+              <a:prstDash val="solid"/>
+              <a:headEnd type="none" w="med" len="med"/>
+              <a:tailEnd type="none" w="med" len="med"/>
+            </a:ln>
+          </p:spPr>
+          <p:style>
+            <a:lnRef idx="1">
+              <a:schemeClr val="accent1"/>
+            </a:lnRef>
+            <a:fillRef idx="0">
+              <a:schemeClr val="accent1"/>
+            </a:fillRef>
+            <a:effectRef idx="0">
+              <a:schemeClr val="accent1"/>
+            </a:effectRef>
+            <a:fontRef idx="minor">
+              <a:schemeClr val="tx1"/>
+            </a:fontRef>
+          </p:style>
+        </p:cxnSp>
+        <p:sp>
+          <p:nvSpPr>
+            <p:cNvPr id="128" name="Ellipse 127">
+              <a:extLst>
+                <a:ext uri="{FF2B5EF4-FFF2-40B4-BE49-F238E27FC236}">
+                  <a16:creationId xmlns:a16="http://schemas.microsoft.com/office/drawing/2014/main" id="{9C9AFE85-5786-47B1-9CDB-404CCF1BF9D7}"/>
+                </a:ext>
+              </a:extLst>
+            </p:cNvPr>
+            <p:cNvSpPr/>
+            <p:nvPr/>
+          </p:nvSpPr>
+          <p:spPr>
+            <a:xfrm>
+              <a:off x="5400557" y="1006821"/>
+              <a:ext cx="142051" cy="142051"/>
+            </a:xfrm>
+            <a:prstGeom prst="ellipse">
+              <a:avLst/>
+            </a:prstGeom>
+            <a:solidFill>
+              <a:srgbClr val="FFA500"/>
+            </a:solidFill>
+            <a:ln>
+              <a:noFill/>
+            </a:ln>
+          </p:spPr>
+          <p:style>
+            <a:lnRef idx="2">
+              <a:schemeClr val="accent1">
+                <a:shade val="50000"/>
+              </a:schemeClr>
+            </a:lnRef>
+            <a:fillRef idx="1">
+              <a:schemeClr val="accent1"/>
+            </a:fillRef>
+            <a:effectRef idx="0">
+              <a:schemeClr val="accent1"/>
+            </a:effectRef>
+            <a:fontRef idx="minor">
+              <a:schemeClr val="lt1"/>
+            </a:fontRef>
+          </p:style>
+          <p:txBody>
+            <a:bodyPr rtlCol="0" anchor="ctr"/>
+            <a:lstStyle/>
+            <a:p>
+              <a:pPr algn="ctr"/>
+              <a:endParaRPr lang="de-CH" dirty="0">
+                <a:latin typeface="Arial" panose="020B0604020202020204" pitchFamily="34" charset="0"/>
+                <a:cs typeface="Arial" panose="020B0604020202020204" pitchFamily="34" charset="0"/>
+              </a:endParaRPr>
+            </a:p>
+          </p:txBody>
+        </p:sp>
+        <p:cxnSp>
+          <p:nvCxnSpPr>
+            <p:cNvPr id="129" name="Gerader Verbinder 128">
+              <a:extLst>
+                <a:ext uri="{FF2B5EF4-FFF2-40B4-BE49-F238E27FC236}">
+                  <a16:creationId xmlns:a16="http://schemas.microsoft.com/office/drawing/2014/main" id="{DD0096A2-BF8E-45EF-B800-2988E59E45D6}"/>
+                </a:ext>
+              </a:extLst>
+            </p:cNvPr>
+            <p:cNvCxnSpPr>
+              <a:cxnSpLocks/>
+            </p:cNvCxnSpPr>
+            <p:nvPr/>
+          </p:nvCxnSpPr>
+          <p:spPr>
+            <a:xfrm>
+              <a:off x="5482325" y="1080976"/>
+              <a:ext cx="1284837" cy="851293"/>
+            </a:xfrm>
+            <a:prstGeom prst="line">
+              <a:avLst/>
+            </a:prstGeom>
+            <a:ln w="28575">
+              <a:solidFill>
+                <a:srgbClr val="FFA500"/>
+              </a:solidFill>
+              <a:prstDash val="solid"/>
+              <a:headEnd type="none" w="med" len="med"/>
+              <a:tailEnd type="none" w="med" len="med"/>
+            </a:ln>
+          </p:spPr>
+          <p:style>
+            <a:lnRef idx="1">
+              <a:schemeClr val="accent1"/>
+            </a:lnRef>
+            <a:fillRef idx="0">
+              <a:schemeClr val="accent1"/>
+            </a:fillRef>
+            <a:effectRef idx="0">
+              <a:schemeClr val="accent1"/>
+            </a:effectRef>
+            <a:fontRef idx="minor">
+              <a:schemeClr val="tx1"/>
+            </a:fontRef>
+          </p:style>
+        </p:cxnSp>
+        <p:sp>
+          <p:nvSpPr>
+            <p:cNvPr id="130" name="Ellipse 129">
+              <a:extLst>
+                <a:ext uri="{FF2B5EF4-FFF2-40B4-BE49-F238E27FC236}">
+                  <a16:creationId xmlns:a16="http://schemas.microsoft.com/office/drawing/2014/main" id="{B83C66F8-E4DD-4529-A38D-9A5A002C707C}"/>
+                </a:ext>
+              </a:extLst>
+            </p:cNvPr>
+            <p:cNvSpPr/>
+            <p:nvPr/>
+          </p:nvSpPr>
+          <p:spPr>
+            <a:xfrm>
+              <a:off x="6687208" y="1857064"/>
+              <a:ext cx="142051" cy="142051"/>
+            </a:xfrm>
+            <a:prstGeom prst="ellipse">
+              <a:avLst/>
+            </a:prstGeom>
+            <a:solidFill>
+              <a:srgbClr val="FFA500"/>
+            </a:solidFill>
+            <a:ln>
+              <a:noFill/>
+            </a:ln>
+          </p:spPr>
+          <p:style>
+            <a:lnRef idx="2">
+              <a:schemeClr val="accent1">
+                <a:shade val="50000"/>
+              </a:schemeClr>
+            </a:lnRef>
+            <a:fillRef idx="1">
+              <a:schemeClr val="accent1"/>
+            </a:fillRef>
+            <a:effectRef idx="0">
+              <a:schemeClr val="accent1"/>
+            </a:effectRef>
+            <a:fontRef idx="minor">
+              <a:schemeClr val="lt1"/>
+            </a:fontRef>
+          </p:style>
+          <p:txBody>
+            <a:bodyPr rtlCol="0" anchor="ctr"/>
+            <a:lstStyle/>
+            <a:p>
+              <a:pPr algn="ctr"/>
+              <a:endParaRPr lang="de-CH" dirty="0">
+                <a:latin typeface="Arial" panose="020B0604020202020204" pitchFamily="34" charset="0"/>
+                <a:cs typeface="Arial" panose="020B0604020202020204" pitchFamily="34" charset="0"/>
+              </a:endParaRPr>
+            </a:p>
+          </p:txBody>
+        </p:sp>
+        <p:cxnSp>
+          <p:nvCxnSpPr>
+            <p:cNvPr id="131" name="Gerader Verbinder 130">
+              <a:extLst>
+                <a:ext uri="{FF2B5EF4-FFF2-40B4-BE49-F238E27FC236}">
+                  <a16:creationId xmlns:a16="http://schemas.microsoft.com/office/drawing/2014/main" id="{0F100FF1-90C1-4861-A795-00385FDAB289}"/>
+                </a:ext>
+              </a:extLst>
+            </p:cNvPr>
+            <p:cNvCxnSpPr>
+              <a:cxnSpLocks/>
+            </p:cNvCxnSpPr>
+            <p:nvPr/>
+          </p:nvCxnSpPr>
+          <p:spPr>
+            <a:xfrm>
+              <a:off x="6759638" y="1909962"/>
+              <a:ext cx="1934" cy="542800"/>
+            </a:xfrm>
+            <a:prstGeom prst="line">
+              <a:avLst/>
+            </a:prstGeom>
+            <a:ln w="28575">
+              <a:solidFill>
+                <a:srgbClr val="FFA500"/>
+              </a:solidFill>
+              <a:prstDash val="solid"/>
+              <a:headEnd type="none" w="med" len="med"/>
+              <a:tailEnd type="none" w="med" len="med"/>
+            </a:ln>
+          </p:spPr>
+          <p:style>
+            <a:lnRef idx="1">
+              <a:schemeClr val="accent1"/>
+            </a:lnRef>
+            <a:fillRef idx="0">
+              <a:schemeClr val="accent1"/>
+            </a:fillRef>
+            <a:effectRef idx="0">
+              <a:schemeClr val="accent1"/>
+            </a:effectRef>
+            <a:fontRef idx="minor">
+              <a:schemeClr val="tx1"/>
+            </a:fontRef>
+          </p:style>
+        </p:cxnSp>
+        <p:sp>
+          <p:nvSpPr>
+            <p:cNvPr id="132" name="Ellipse 131">
+              <a:extLst>
+                <a:ext uri="{FF2B5EF4-FFF2-40B4-BE49-F238E27FC236}">
+                  <a16:creationId xmlns:a16="http://schemas.microsoft.com/office/drawing/2014/main" id="{D650612E-4419-4116-8F91-13ABBFA8FDF9}"/>
+                </a:ext>
+              </a:extLst>
+            </p:cNvPr>
+            <p:cNvSpPr/>
+            <p:nvPr/>
+          </p:nvSpPr>
+          <p:spPr>
+            <a:xfrm>
+              <a:off x="6687208" y="2386261"/>
+              <a:ext cx="142051" cy="142051"/>
+            </a:xfrm>
+            <a:prstGeom prst="ellipse">
+              <a:avLst/>
+            </a:prstGeom>
+            <a:solidFill>
+              <a:srgbClr val="FFA500"/>
+            </a:solidFill>
+            <a:ln>
+              <a:noFill/>
+            </a:ln>
+          </p:spPr>
+          <p:style>
+            <a:lnRef idx="2">
+              <a:schemeClr val="accent1">
+                <a:shade val="50000"/>
+              </a:schemeClr>
+            </a:lnRef>
+            <a:fillRef idx="1">
+              <a:schemeClr val="accent1"/>
+            </a:fillRef>
+            <a:effectRef idx="0">
+              <a:schemeClr val="accent1"/>
+            </a:effectRef>
+            <a:fontRef idx="minor">
+              <a:schemeClr val="lt1"/>
+            </a:fontRef>
+          </p:style>
+          <p:txBody>
+            <a:bodyPr rtlCol="0" anchor="ctr"/>
+            <a:lstStyle/>
+            <a:p>
+              <a:pPr algn="ctr"/>
+              <a:endParaRPr lang="de-CH" dirty="0">
+                <a:latin typeface="Arial" panose="020B0604020202020204" pitchFamily="34" charset="0"/>
+                <a:cs typeface="Arial" panose="020B0604020202020204" pitchFamily="34" charset="0"/>
+              </a:endParaRPr>
+            </a:p>
+          </p:txBody>
+        </p:sp>
+        <p:pic>
+          <p:nvPicPr>
+            <p:cNvPr id="133" name="Grafik 132">
+              <a:extLst>
+                <a:ext uri="{FF2B5EF4-FFF2-40B4-BE49-F238E27FC236}">
+                  <a16:creationId xmlns:a16="http://schemas.microsoft.com/office/drawing/2014/main" id="{3EBBF7A1-46AB-4A72-A782-F1099FB299B4}"/>
+                </a:ext>
+              </a:extLst>
+            </p:cNvPr>
+            <p:cNvPicPr>
+              <a:picLocks noChangeAspect="1"/>
+            </p:cNvPicPr>
+            <p:nvPr/>
+          </p:nvPicPr>
+          <p:blipFill>
+            <a:blip r:embed="rId9">
+              <a:extLst>
+                <a:ext uri="{28A0092B-C50C-407E-A947-70E740481C1C}">
+                  <a14:useLocalDpi xmlns:a14="http://schemas.microsoft.com/office/drawing/2010/main" val="0"/>
+                </a:ext>
+                <a:ext uri="{96DAC541-7B7A-43D3-8B79-37D633B846F1}">
+                  <asvg:svgBlip xmlns:asvg="http://schemas.microsoft.com/office/drawing/2016/SVG/main" r:embed="rId10"/>
+                </a:ext>
+              </a:extLst>
+            </a:blip>
+            <a:stretch>
+              <a:fillRect/>
+            </a:stretch>
+          </p:blipFill>
+          <p:spPr>
+            <a:xfrm rot="3155483">
+              <a:off x="3796121" y="1569015"/>
+              <a:ext cx="759965" cy="1074862"/>
+            </a:xfrm>
+            <a:prstGeom prst="rect">
+              <a:avLst/>
+            </a:prstGeom>
+          </p:spPr>
+        </p:pic>
+      </p:grpSp>
+      <p:cxnSp>
+        <p:nvCxnSpPr>
+          <p:cNvPr id="162" name="Gerader Verbinder 161">
+            <a:extLst>
+              <a:ext uri="{FF2B5EF4-FFF2-40B4-BE49-F238E27FC236}">
+                <a16:creationId xmlns:a16="http://schemas.microsoft.com/office/drawing/2014/main" id="{9FD43C51-1455-4757-AB32-7A73CCCF2F10}"/>
+              </a:ext>
+            </a:extLst>
+          </p:cNvPr>
+          <p:cNvCxnSpPr>
+            <a:cxnSpLocks/>
+            <a:stCxn id="50" idx="0"/>
+          </p:cNvCxnSpPr>
+          <p:nvPr/>
+        </p:nvCxnSpPr>
+        <p:spPr>
+          <a:xfrm flipH="1" flipV="1">
+            <a:off x="6710583" y="2599178"/>
+            <a:ext cx="366032" cy="414324"/>
+          </a:xfrm>
+          <a:prstGeom prst="line">
+            <a:avLst/>
+          </a:prstGeom>
+          <a:ln w="12700">
+            <a:solidFill>
+              <a:schemeClr val="tx1"/>
+            </a:solidFill>
+            <a:prstDash val="dash"/>
+            <a:headEnd type="none" w="med" len="med"/>
+            <a:tailEnd type="triangle" w="med" len="med"/>
+          </a:ln>
+          <a:effectLst/>
+        </p:spPr>
+        <p:style>
+          <a:lnRef idx="1">
+            <a:schemeClr val="accent1"/>
+          </a:lnRef>
+          <a:fillRef idx="0">
+            <a:schemeClr val="accent1"/>
+          </a:fillRef>
+          <a:effectRef idx="0">
+            <a:schemeClr val="accent1"/>
+          </a:effectRef>
+          <a:fontRef idx="minor">
+            <a:schemeClr val="tx1"/>
+          </a:fontRef>
+        </p:style>
+      </p:cxnSp>
+      <p:cxnSp>
+        <p:nvCxnSpPr>
+          <p:cNvPr id="167" name="Gerader Verbinder 166">
+            <a:extLst>
+              <a:ext uri="{FF2B5EF4-FFF2-40B4-BE49-F238E27FC236}">
+                <a16:creationId xmlns:a16="http://schemas.microsoft.com/office/drawing/2014/main" id="{81332489-07C9-4937-B1C8-B93393523D43}"/>
+              </a:ext>
+            </a:extLst>
+          </p:cNvPr>
+          <p:cNvCxnSpPr>
+            <a:cxnSpLocks/>
+            <a:endCxn id="71" idx="2"/>
+          </p:cNvCxnSpPr>
+          <p:nvPr/>
+        </p:nvCxnSpPr>
+        <p:spPr>
+          <a:xfrm flipH="1" flipV="1">
+            <a:off x="1318017" y="3852118"/>
+            <a:ext cx="93562" cy="406448"/>
+          </a:xfrm>
+          <a:prstGeom prst="line">
+            <a:avLst/>
+          </a:prstGeom>
+          <a:ln w="12700">
+            <a:solidFill>
+              <a:schemeClr val="tx1"/>
+            </a:solidFill>
+            <a:prstDash val="dash"/>
+            <a:headEnd type="triangle" w="med" len="med"/>
+            <a:tailEnd type="none" w="med" len="med"/>
+          </a:ln>
+          <a:effectLst/>
+        </p:spPr>
+        <p:style>
+          <a:lnRef idx="1">
+            <a:schemeClr val="accent1"/>
+          </a:lnRef>
+          <a:fillRef idx="0">
+            <a:schemeClr val="accent1"/>
+          </a:fillRef>
+          <a:effectRef idx="0">
+            <a:schemeClr val="accent1"/>
+          </a:effectRef>
+          <a:fontRef idx="minor">
+            <a:schemeClr val="tx1"/>
+          </a:fontRef>
+        </p:style>
+      </p:cxnSp>
+      <p:pic>
+        <p:nvPicPr>
+          <p:cNvPr id="158" name="Grafik 157">
+            <a:extLst>
+              <a:ext uri="{FF2B5EF4-FFF2-40B4-BE49-F238E27FC236}">
+                <a16:creationId xmlns:a16="http://schemas.microsoft.com/office/drawing/2014/main" id="{F30E3CBA-2E38-42DB-8D7D-9D07EF01B58B}"/>
+              </a:ext>
+            </a:extLst>
+          </p:cNvPr>
+          <p:cNvPicPr>
+            <a:picLocks noChangeAspect="1"/>
+          </p:cNvPicPr>
+          <p:nvPr/>
+        </p:nvPicPr>
+        <p:blipFill>
+          <a:blip r:embed="rId11"/>
+          <a:stretch>
+            <a:fillRect/>
+          </a:stretch>
+        </p:blipFill>
+        <p:spPr>
+          <a:xfrm>
+            <a:off x="247683" y="754103"/>
+            <a:ext cx="3542710" cy="1845074"/>
+          </a:xfrm>
+          <a:prstGeom prst="rect">
+            <a:avLst/>
+          </a:prstGeom>
+          <a:effectLst/>
+        </p:spPr>
+      </p:pic>
+      <p:grpSp>
+        <p:nvGrpSpPr>
+          <p:cNvPr id="163" name="Gruppieren 162">
+            <a:extLst>
+              <a:ext uri="{FF2B5EF4-FFF2-40B4-BE49-F238E27FC236}">
+                <a16:creationId xmlns:a16="http://schemas.microsoft.com/office/drawing/2014/main" id="{F22208C7-7580-44E1-9CE5-52A41B0638A7}"/>
+              </a:ext>
+            </a:extLst>
+          </p:cNvPr>
+          <p:cNvGrpSpPr/>
+          <p:nvPr/>
+        </p:nvGrpSpPr>
+        <p:grpSpPr>
+          <a:xfrm>
+            <a:off x="9379095" y="5593043"/>
+            <a:ext cx="2572850" cy="613310"/>
+            <a:chOff x="9474866" y="5526730"/>
+            <a:chExt cx="2536073" cy="613310"/>
+          </a:xfrm>
+          <a:effectLst/>
+        </p:grpSpPr>
+        <p:grpSp>
+          <p:nvGrpSpPr>
+            <p:cNvPr id="164" name="Gruppieren 163">
+              <a:extLst>
+                <a:ext uri="{FF2B5EF4-FFF2-40B4-BE49-F238E27FC236}">
+                  <a16:creationId xmlns:a16="http://schemas.microsoft.com/office/drawing/2014/main" id="{C78F44DD-5E4F-448C-998F-265FA60C31B7}"/>
+                </a:ext>
+              </a:extLst>
+            </p:cNvPr>
+            <p:cNvGrpSpPr/>
+            <p:nvPr/>
+          </p:nvGrpSpPr>
+          <p:grpSpPr>
+            <a:xfrm>
+              <a:off x="9474866" y="5609661"/>
+              <a:ext cx="2536073" cy="464559"/>
+              <a:chOff x="6263417" y="4618370"/>
+              <a:chExt cx="2536073" cy="464559"/>
+            </a:xfrm>
+          </p:grpSpPr>
+          <p:grpSp>
+            <p:nvGrpSpPr>
+              <p:cNvPr id="168" name="Gruppieren 167">
+                <a:extLst>
+                  <a:ext uri="{FF2B5EF4-FFF2-40B4-BE49-F238E27FC236}">
+                    <a16:creationId xmlns:a16="http://schemas.microsoft.com/office/drawing/2014/main" id="{02073224-2119-4D29-8648-4CD5088AA3E8}"/>
+                  </a:ext>
+                </a:extLst>
+              </p:cNvPr>
+              <p:cNvGrpSpPr/>
+              <p:nvPr/>
+            </p:nvGrpSpPr>
+            <p:grpSpPr>
+              <a:xfrm>
+                <a:off x="6267958" y="4650855"/>
+                <a:ext cx="2531532" cy="426463"/>
+                <a:chOff x="7099283" y="3819674"/>
+                <a:chExt cx="2531532" cy="426463"/>
+              </a:xfrm>
+            </p:grpSpPr>
+            <p:sp>
+              <p:nvSpPr>
+                <p:cNvPr id="176" name="Ellipse 175">
+                  <a:extLst>
+                    <a:ext uri="{FF2B5EF4-FFF2-40B4-BE49-F238E27FC236}">
+                      <a16:creationId xmlns:a16="http://schemas.microsoft.com/office/drawing/2014/main" id="{C7B82272-635B-44BC-ABF1-152D14DBEECD}"/>
+                    </a:ext>
+                  </a:extLst>
+                </p:cNvPr>
+                <p:cNvSpPr/>
+                <p:nvPr/>
+              </p:nvSpPr>
+              <p:spPr>
+                <a:xfrm>
+                  <a:off x="7099283" y="3822094"/>
+                  <a:ext cx="424043" cy="424043"/>
+                </a:xfrm>
+                <a:prstGeom prst="ellipse">
+                  <a:avLst/>
+                </a:prstGeom>
+                <a:solidFill>
+                  <a:srgbClr val="FFA500">
+                    <a:alpha val="50196"/>
+                  </a:srgbClr>
+                </a:solidFill>
+                <a:ln w="19050">
+                  <a:solidFill>
+                    <a:schemeClr val="tx1"/>
+                  </a:solidFill>
+                </a:ln>
+              </p:spPr>
+              <p:style>
+                <a:lnRef idx="2">
+                  <a:schemeClr val="accent1">
+                    <a:shade val="50000"/>
+                  </a:schemeClr>
+                </a:lnRef>
+                <a:fillRef idx="1">
+                  <a:schemeClr val="accent1"/>
+                </a:fillRef>
+                <a:effectRef idx="0">
+                  <a:schemeClr val="accent1"/>
+                </a:effectRef>
+                <a:fontRef idx="minor">
+                  <a:schemeClr val="lt1"/>
+                </a:fontRef>
+              </p:style>
+              <p:txBody>
+                <a:bodyPr rtlCol="0" anchor="ctr"/>
+                <a:lstStyle/>
+                <a:p>
+                  <a:pPr algn="ctr"/>
+                  <a:endParaRPr lang="de-CH">
+                    <a:latin typeface="Arial" panose="020B0604020202020204" pitchFamily="34" charset="0"/>
+                    <a:cs typeface="Arial" panose="020B0604020202020204" pitchFamily="34" charset="0"/>
+                  </a:endParaRPr>
+                </a:p>
+              </p:txBody>
+            </p:sp>
+            <p:sp>
+              <p:nvSpPr>
+                <p:cNvPr id="177" name="Ellipse 176">
+                  <a:extLst>
+                    <a:ext uri="{FF2B5EF4-FFF2-40B4-BE49-F238E27FC236}">
+                      <a16:creationId xmlns:a16="http://schemas.microsoft.com/office/drawing/2014/main" id="{A91850FD-7786-45D3-8676-498E0A19D7C2}"/>
+                    </a:ext>
+                  </a:extLst>
+                </p:cNvPr>
+                <p:cNvSpPr/>
+                <p:nvPr/>
+              </p:nvSpPr>
+              <p:spPr>
+                <a:xfrm>
+                  <a:off x="9206772" y="3819674"/>
+                  <a:ext cx="424043" cy="424043"/>
+                </a:xfrm>
+                <a:prstGeom prst="ellipse">
+                  <a:avLst/>
+                </a:prstGeom>
+                <a:solidFill>
+                  <a:srgbClr val="FFA500">
+                    <a:alpha val="50196"/>
+                  </a:srgbClr>
+                </a:solidFill>
+                <a:ln w="19050">
+                  <a:solidFill>
+                    <a:schemeClr val="tx1"/>
+                  </a:solidFill>
+                </a:ln>
+              </p:spPr>
+              <p:style>
+                <a:lnRef idx="2">
+                  <a:schemeClr val="accent1">
+                    <a:shade val="50000"/>
+                  </a:schemeClr>
+                </a:lnRef>
+                <a:fillRef idx="1">
+                  <a:schemeClr val="accent1"/>
+                </a:fillRef>
+                <a:effectRef idx="0">
+                  <a:schemeClr val="accent1"/>
+                </a:effectRef>
+                <a:fontRef idx="minor">
+                  <a:schemeClr val="lt1"/>
+                </a:fontRef>
+              </p:style>
+              <p:txBody>
+                <a:bodyPr rtlCol="0" anchor="ctr"/>
+                <a:lstStyle/>
+                <a:p>
+                  <a:pPr algn="ctr"/>
+                  <a:endParaRPr lang="de-CH">
+                    <a:latin typeface="Arial" panose="020B0604020202020204" pitchFamily="34" charset="0"/>
+                    <a:cs typeface="Arial" panose="020B0604020202020204" pitchFamily="34" charset="0"/>
+                  </a:endParaRPr>
+                </a:p>
+              </p:txBody>
+            </p:sp>
+          </p:grpSp>
+          <p:cxnSp>
+            <p:nvCxnSpPr>
+              <p:cNvPr id="169" name="Verbinder: gekrümmt 168">
+                <a:extLst>
+                  <a:ext uri="{FF2B5EF4-FFF2-40B4-BE49-F238E27FC236}">
+                    <a16:creationId xmlns:a16="http://schemas.microsoft.com/office/drawing/2014/main" id="{0169A1BB-C3AE-493F-B23A-27CE73F41E98}"/>
+                  </a:ext>
+                </a:extLst>
+              </p:cNvPr>
+              <p:cNvCxnSpPr>
+                <a:cxnSpLocks/>
+                <a:stCxn id="176" idx="7"/>
+                <a:endCxn id="177" idx="1"/>
+              </p:cNvCxnSpPr>
+              <p:nvPr/>
+            </p:nvCxnSpPr>
+            <p:spPr>
+              <a:xfrm rot="5400000" flipH="1" flipV="1">
+                <a:off x="7532514" y="3810342"/>
+                <a:ext cx="2420" cy="1807646"/>
+              </a:xfrm>
+              <a:prstGeom prst="curvedConnector3">
+                <a:avLst>
+                  <a:gd name="adj1" fmla="val 5913264"/>
+                </a:avLst>
+              </a:prstGeom>
+              <a:ln w="38100">
+                <a:solidFill>
+                  <a:schemeClr val="tx1"/>
+                </a:solidFill>
+                <a:tailEnd type="triangle"/>
+              </a:ln>
+            </p:spPr>
+            <p:style>
+              <a:lnRef idx="1">
+                <a:schemeClr val="accent1"/>
+              </a:lnRef>
+              <a:fillRef idx="0">
+                <a:schemeClr val="accent1"/>
+              </a:fillRef>
+              <a:effectRef idx="0">
+                <a:schemeClr val="accent1"/>
+              </a:effectRef>
+              <a:fontRef idx="minor">
+                <a:schemeClr val="tx1"/>
+              </a:fontRef>
+            </p:style>
+          </p:cxnSp>
+          <p:cxnSp>
+            <p:nvCxnSpPr>
+              <p:cNvPr id="171" name="Verbinder: gekrümmt 170">
+                <a:extLst>
+                  <a:ext uri="{FF2B5EF4-FFF2-40B4-BE49-F238E27FC236}">
+                    <a16:creationId xmlns:a16="http://schemas.microsoft.com/office/drawing/2014/main" id="{127E8382-4A90-41D9-B1D0-26C017D25F4E}"/>
+                  </a:ext>
+                </a:extLst>
+              </p:cNvPr>
+              <p:cNvCxnSpPr>
+                <a:cxnSpLocks/>
+                <a:stCxn id="177" idx="3"/>
+                <a:endCxn id="176" idx="5"/>
+              </p:cNvCxnSpPr>
+              <p:nvPr/>
+            </p:nvCxnSpPr>
+            <p:spPr>
+              <a:xfrm rot="5400000">
+                <a:off x="7532514" y="4110185"/>
+                <a:ext cx="2420" cy="1807646"/>
+              </a:xfrm>
+              <a:prstGeom prst="curvedConnector3">
+                <a:avLst>
+                  <a:gd name="adj1" fmla="val 4419587"/>
+                </a:avLst>
+              </a:prstGeom>
+              <a:ln w="12700">
+                <a:solidFill>
+                  <a:schemeClr val="tx1"/>
+                </a:solidFill>
+                <a:tailEnd type="triangle"/>
+              </a:ln>
+            </p:spPr>
+            <p:style>
+              <a:lnRef idx="1">
+                <a:schemeClr val="accent1"/>
+              </a:lnRef>
+              <a:fillRef idx="0">
+                <a:schemeClr val="accent1"/>
+              </a:fillRef>
+              <a:effectRef idx="0">
+                <a:schemeClr val="accent1"/>
+              </a:effectRef>
+              <a:fontRef idx="minor">
+                <a:schemeClr val="tx1"/>
+              </a:fontRef>
+            </p:style>
+          </p:cxnSp>
+          <p:sp>
+            <p:nvSpPr>
+              <p:cNvPr id="172" name="Textfeld 171">
+                <a:extLst>
+                  <a:ext uri="{FF2B5EF4-FFF2-40B4-BE49-F238E27FC236}">
+                    <a16:creationId xmlns:a16="http://schemas.microsoft.com/office/drawing/2014/main" id="{8A656023-9607-4BFC-85C0-D3F2C4B1AA07}"/>
+                  </a:ext>
+                </a:extLst>
+              </p:cNvPr>
+              <p:cNvSpPr txBox="1"/>
+              <p:nvPr/>
+            </p:nvSpPr>
+            <p:spPr>
+              <a:xfrm>
+                <a:off x="6263417" y="4618370"/>
+                <a:ext cx="424043" cy="461665"/>
+              </a:xfrm>
+              <a:prstGeom prst="rect">
+                <a:avLst/>
+              </a:prstGeom>
+              <a:noFill/>
+            </p:spPr>
+            <p:txBody>
+              <a:bodyPr wrap="square" rtlCol="0">
+                <a:spAutoFit/>
+              </a:bodyPr>
+              <a:lstStyle/>
+              <a:p>
+                <a:pPr algn="ctr"/>
+                <a:r>
+                  <a:rPr lang="de-CH" sz="2400" dirty="0">
+                    <a:latin typeface="Arial" panose="020B0604020202020204" pitchFamily="34" charset="0"/>
+                    <a:cs typeface="Arial" panose="020B0604020202020204" pitchFamily="34" charset="0"/>
+                  </a:rPr>
+                  <a:t>A</a:t>
+                </a:r>
+              </a:p>
+            </p:txBody>
+          </p:sp>
+          <p:sp>
+            <p:nvSpPr>
+              <p:cNvPr id="173" name="Textfeld 172">
+                <a:extLst>
+                  <a:ext uri="{FF2B5EF4-FFF2-40B4-BE49-F238E27FC236}">
+                    <a16:creationId xmlns:a16="http://schemas.microsoft.com/office/drawing/2014/main" id="{CCD364BE-5F11-4C87-95ED-8749CD6B8DD5}"/>
+                  </a:ext>
+                </a:extLst>
+              </p:cNvPr>
+              <p:cNvSpPr txBox="1"/>
+              <p:nvPr/>
+            </p:nvSpPr>
+            <p:spPr>
+              <a:xfrm>
+                <a:off x="8369714" y="4621264"/>
+                <a:ext cx="424043" cy="461665"/>
+              </a:xfrm>
+              <a:prstGeom prst="rect">
+                <a:avLst/>
+              </a:prstGeom>
+              <a:noFill/>
+            </p:spPr>
+            <p:txBody>
+              <a:bodyPr wrap="square" rtlCol="0">
+                <a:spAutoFit/>
+              </a:bodyPr>
+              <a:lstStyle/>
+              <a:p>
+                <a:pPr algn="ctr"/>
+                <a:r>
+                  <a:rPr lang="de-CH" sz="2400" dirty="0">
+                    <a:latin typeface="Arial" panose="020B0604020202020204" pitchFamily="34" charset="0"/>
+                    <a:cs typeface="Arial" panose="020B0604020202020204" pitchFamily="34" charset="0"/>
+                  </a:rPr>
+                  <a:t>B</a:t>
+                </a:r>
+              </a:p>
+            </p:txBody>
+          </p:sp>
+        </p:grpSp>
+        <p:sp>
+          <p:nvSpPr>
+            <p:cNvPr id="165" name="Textfeld 164">
+              <a:extLst>
+                <a:ext uri="{FF2B5EF4-FFF2-40B4-BE49-F238E27FC236}">
+                  <a16:creationId xmlns:a16="http://schemas.microsoft.com/office/drawing/2014/main" id="{9A249D72-3CF0-4932-8DD3-1BF2A8B2F601}"/>
+                </a:ext>
+              </a:extLst>
+            </p:cNvPr>
+            <p:cNvSpPr txBox="1"/>
+            <p:nvPr/>
+          </p:nvSpPr>
+          <p:spPr>
+            <a:xfrm>
+              <a:off x="10496558" y="5526730"/>
+              <a:ext cx="424043" cy="230832"/>
+            </a:xfrm>
+            <a:prstGeom prst="rect">
+              <a:avLst/>
+            </a:prstGeom>
+            <a:noFill/>
+          </p:spPr>
+          <p:txBody>
+            <a:bodyPr wrap="square" rtlCol="0">
+              <a:spAutoFit/>
+            </a:bodyPr>
+            <a:lstStyle/>
+            <a:p>
+              <a:pPr algn="ctr"/>
+              <a:r>
+                <a:rPr lang="de-CH" sz="900" i="1" dirty="0">
+                  <a:latin typeface="Arial" panose="020B0604020202020204" pitchFamily="34" charset="0"/>
+                  <a:cs typeface="Arial" panose="020B0604020202020204" pitchFamily="34" charset="0"/>
+                </a:rPr>
+                <a:t>0.6</a:t>
+              </a:r>
+            </a:p>
+          </p:txBody>
+        </p:sp>
+        <p:sp>
+          <p:nvSpPr>
+            <p:cNvPr id="166" name="Textfeld 165">
+              <a:extLst>
+                <a:ext uri="{FF2B5EF4-FFF2-40B4-BE49-F238E27FC236}">
+                  <a16:creationId xmlns:a16="http://schemas.microsoft.com/office/drawing/2014/main" id="{B9F61406-80CE-479E-8ECB-89D8BD37FA9A}"/>
+                </a:ext>
+              </a:extLst>
+            </p:cNvPr>
+            <p:cNvSpPr txBox="1"/>
+            <p:nvPr/>
+          </p:nvSpPr>
+          <p:spPr>
+            <a:xfrm>
+              <a:off x="10496557" y="5909208"/>
+              <a:ext cx="424043" cy="230832"/>
+            </a:xfrm>
+            <a:prstGeom prst="rect">
+              <a:avLst/>
+            </a:prstGeom>
+            <a:noFill/>
+          </p:spPr>
+          <p:txBody>
+            <a:bodyPr wrap="square" rtlCol="0">
+              <a:spAutoFit/>
+            </a:bodyPr>
+            <a:lstStyle/>
+            <a:p>
+              <a:pPr algn="ctr"/>
+              <a:r>
+                <a:rPr lang="de-CH" sz="900" i="1" dirty="0">
+                  <a:latin typeface="Arial" panose="020B0604020202020204" pitchFamily="34" charset="0"/>
+                  <a:cs typeface="Arial" panose="020B0604020202020204" pitchFamily="34" charset="0"/>
+                </a:rPr>
+                <a:t>0.3</a:t>
+              </a:r>
+            </a:p>
+          </p:txBody>
+        </p:sp>
+      </p:grpSp>
+      <p:cxnSp>
+        <p:nvCxnSpPr>
+          <p:cNvPr id="191" name="Gerader Verbinder 190">
+            <a:extLst>
+              <a:ext uri="{FF2B5EF4-FFF2-40B4-BE49-F238E27FC236}">
+                <a16:creationId xmlns:a16="http://schemas.microsoft.com/office/drawing/2014/main" id="{A3D9F5CD-1689-4965-9FA3-BB5BA09C21D8}"/>
+              </a:ext>
+            </a:extLst>
+          </p:cNvPr>
+          <p:cNvCxnSpPr>
+            <a:cxnSpLocks/>
+            <a:stCxn id="68" idx="2"/>
+          </p:cNvCxnSpPr>
+          <p:nvPr/>
+        </p:nvCxnSpPr>
+        <p:spPr>
+          <a:xfrm>
+            <a:off x="4350408" y="3848308"/>
+            <a:ext cx="629442" cy="410257"/>
+          </a:xfrm>
+          <a:prstGeom prst="line">
+            <a:avLst/>
+          </a:prstGeom>
+          <a:ln w="12700">
+            <a:solidFill>
+              <a:schemeClr val="tx1"/>
+            </a:solidFill>
+            <a:prstDash val="dash"/>
+            <a:headEnd type="none" w="med" len="med"/>
+            <a:tailEnd type="triangle" w="med" len="med"/>
+          </a:ln>
+          <a:effectLst/>
+        </p:spPr>
+        <p:style>
+          <a:lnRef idx="1">
+            <a:schemeClr val="accent1"/>
+          </a:lnRef>
+          <a:fillRef idx="0">
+            <a:schemeClr val="accent1"/>
+          </a:fillRef>
+          <a:effectRef idx="0">
+            <a:schemeClr val="accent1"/>
+          </a:effectRef>
+          <a:fontRef idx="minor">
+            <a:schemeClr val="tx1"/>
+          </a:fontRef>
+        </p:style>
+      </p:cxnSp>
+      <p:cxnSp>
+        <p:nvCxnSpPr>
+          <p:cNvPr id="192" name="Verbinder: gekrümmt 191">
+            <a:extLst>
+              <a:ext uri="{FF2B5EF4-FFF2-40B4-BE49-F238E27FC236}">
+                <a16:creationId xmlns:a16="http://schemas.microsoft.com/office/drawing/2014/main" id="{888B38C0-E0B5-44C5-9EC4-CA5E77D64320}"/>
+              </a:ext>
+            </a:extLst>
+          </p:cNvPr>
+          <p:cNvCxnSpPr>
+            <a:cxnSpLocks/>
+            <a:stCxn id="68" idx="3"/>
+            <a:endCxn id="50" idx="1"/>
+          </p:cNvCxnSpPr>
+          <p:nvPr/>
+        </p:nvCxnSpPr>
+        <p:spPr>
+          <a:xfrm flipV="1">
+            <a:off x="5470954" y="3429000"/>
+            <a:ext cx="660316" cy="3810"/>
+          </a:xfrm>
+          <a:prstGeom prst="curvedConnector3">
+            <a:avLst>
+              <a:gd name="adj1" fmla="val 50000"/>
+            </a:avLst>
+          </a:prstGeom>
+          <a:ln w="28575">
+            <a:solidFill>
+              <a:schemeClr val="tx1"/>
+            </a:solidFill>
+            <a:tailEnd type="triangle"/>
+          </a:ln>
+          <a:effectLst/>
+        </p:spPr>
+        <p:style>
+          <a:lnRef idx="1">
+            <a:schemeClr val="accent1"/>
+          </a:lnRef>
+          <a:fillRef idx="0">
+            <a:schemeClr val="accent1"/>
+          </a:fillRef>
+          <a:effectRef idx="0">
+            <a:schemeClr val="accent1"/>
+          </a:effectRef>
+          <a:fontRef idx="minor">
+            <a:schemeClr val="tx1"/>
+          </a:fontRef>
+        </p:style>
+      </p:cxnSp>
+    </p:spTree>
+    <p:extLst>
+      <p:ext uri="{BB962C8B-B14F-4D97-AF65-F5344CB8AC3E}">
+        <p14:creationId xmlns:p14="http://schemas.microsoft.com/office/powerpoint/2010/main" val="608387932"/>
+      </p:ext>
+    </p:extLst>
+  </p:cSld>
+  <p:clrMapOvr>
+    <a:masterClrMapping/>
+  </p:clrMapOvr>
+  <p:timing>
+    <p:tnLst>
+      <p:par>
+        <p:cTn id="1" dur="indefinite" restart="never" nodeType="tmRoot">
+          <p:childTnLst>
+            <p:seq concurrent="1" nextAc="seek">
+              <p:cTn id="2" dur="indefinite" nodeType="mainSeq">
+                <p:childTnLst>
+                  <p:par>
+                    <p:cTn id="3" fill="hold">
+                      <p:stCondLst>
+                        <p:cond delay="indefinite"/>
+                      </p:stCondLst>
+                      <p:childTnLst>
+                        <p:par>
+                          <p:cTn id="4" fill="hold">
+                            <p:stCondLst>
+                              <p:cond delay="0"/>
+                            </p:stCondLst>
+                            <p:childTnLst>
+                              <p:par>
+                                <p:cTn id="5" presetID="10" presetClass="entr" presetSubtype="0" fill="hold" nodeType="clickEffect">
+                                  <p:stCondLst>
+                                    <p:cond delay="0"/>
+                                  </p:stCondLst>
+                                  <p:childTnLst>
+                                    <p:set>
+                                      <p:cBhvr>
+                                        <p:cTn id="6" dur="1" fill="hold">
+                                          <p:stCondLst>
+                                            <p:cond delay="0"/>
+                                          </p:stCondLst>
+                                        </p:cTn>
+                                        <p:tgtEl>
+                                          <p:spTgt spid="158"/>
+                                        </p:tgtEl>
+                                        <p:attrNameLst>
+                                          <p:attrName>style.visibility</p:attrName>
+                                        </p:attrNameLst>
+                                      </p:cBhvr>
+                                      <p:to>
+                                        <p:strVal val="visible"/>
+                                      </p:to>
+                                    </p:set>
+                                    <p:animEffect transition="in" filter="fade">
+                                      <p:cBhvr>
+                                        <p:cTn id="7" dur="500"/>
+                                        <p:tgtEl>
+                                          <p:spTgt spid="158"/>
+                                        </p:tgtEl>
+                                      </p:cBhvr>
+                                    </p:animEffect>
+                                  </p:childTnLst>
+                                </p:cTn>
+                              </p:par>
+                            </p:childTnLst>
+                          </p:cTn>
+                        </p:par>
+                      </p:childTnLst>
+                    </p:cTn>
+                  </p:par>
+                </p:childTnLst>
+              </p:cTn>
+              <p:prevCondLst>
+                <p:cond evt="onPrev" delay="0">
+                  <p:tgtEl>
+                    <p:sldTgt/>
+                  </p:tgtEl>
+                </p:cond>
+              </p:prevCondLst>
+              <p:nextCondLst>
+                <p:cond evt="onNext" delay="0">
+                  <p:tgtEl>
+                    <p:sldTgt/>
+                  </p:tgtEl>
+                </p:cond>
+              </p:nextCondLst>
+            </p:seq>
+          </p:childTnLst>
+        </p:cTn>
+      </p:par>
+    </p:tnLst>
+  </p:timing>
+</p:sld>
+</file>
+
+<file path=ppt/slides/slide2.xml><?xml version="1.0" encoding="utf-8"?>
 <p:sld xmlns:a="http://schemas.openxmlformats.org/drawingml/2006/main" xmlns:r="http://schemas.openxmlformats.org/officeDocument/2006/relationships" xmlns:p="http://schemas.openxmlformats.org/presentationml/2006/main">
   <p:cSld>
     <p:spTree>
@@ -7480,8 +11548,8 @@
           </p:txBody>
         </p:sp>
       </p:grpSp>
-      <mc:AlternateContent xmlns:mc="http://schemas.openxmlformats.org/markup-compatibility/2006">
-        <mc:Choice xmlns:a14="http://schemas.microsoft.com/office/drawing/2010/main" Requires="a14">
+      <mc:AlternateContent xmlns:mc="http://schemas.openxmlformats.org/markup-compatibility/2006" xmlns:a14="http://schemas.microsoft.com/office/drawing/2010/main">
+        <mc:Choice Requires="a14">
           <p:sp>
             <p:nvSpPr>
               <p:cNvPr id="246" name="Textfeld 245">
@@ -7520,7 +11588,7 @@
                             <a:lumMod val="75000"/>
                           </a:schemeClr>
                         </a:solidFill>
-                        <a:latin typeface="Bahnschrift Light SemiCondensed" panose="020B0502040204020203" pitchFamily="34" charset="0"/>
+                        <a:latin typeface="Cambria Math" panose="02040503050406030204" pitchFamily="18" charset="0"/>
                       </a:rPr>
                       <m:t>𝛽</m:t>
                     </m:r>
@@ -7560,7 +11628,7 @@
             </p:txBody>
           </p:sp>
         </mc:Choice>
-        <mc:Fallback>
+        <mc:Fallback xmlns="">
           <p:sp>
             <p:nvSpPr>
               <p:cNvPr id="246" name="Textfeld 245">

</xml_diff>